<commit_message>
xoa con 1 trang
</commit_message>
<xml_diff>
--- a/BỘ-TÀI-NGUYÊN-MÔI-TRƯỜNG-1.pptx
+++ b/BỘ-TÀI-NGUYÊN-MÔI-TRƯỜNG-1.pptx
@@ -5,13 +5,10 @@
     <p:sldMasterId id="2147483648" r:id="rId1"/>
   </p:sldMasterIdLst>
   <p:notesMasterIdLst>
-    <p:notesMasterId r:id="rId6"/>
+    <p:notesMasterId r:id="rId3"/>
   </p:notesMasterIdLst>
   <p:sldIdLst>
-    <p:sldId id="288" r:id="rId2"/>
-    <p:sldId id="290" r:id="rId3"/>
-    <p:sldId id="291" r:id="rId4"/>
-    <p:sldId id="292" r:id="rId5"/>
+    <p:sldId id="292" r:id="rId2"/>
   </p:sldIdLst>
   <p:sldSz cx="12192000" cy="6858000"/>
   <p:notesSz cx="7104063" cy="10234613"/>
@@ -5666,62 +5663,6 @@
 </p:notesMaster>
 </file>
 
-<file path=ppt/notesSlides/notesSlide1.xml><?xml version="1.0" encoding="utf-8"?>
-<p:notes xmlns:a="http://schemas.openxmlformats.org/drawingml/2006/main" xmlns:r="http://schemas.openxmlformats.org/officeDocument/2006/relationships" xmlns:p="http://schemas.openxmlformats.org/presentationml/2006/main">
-  <p:cSld>
-    <p:spTree>
-      <p:nvGrpSpPr>
-        <p:cNvPr id="1" name=""/>
-        <p:cNvGrpSpPr/>
-        <p:nvPr/>
-      </p:nvGrpSpPr>
-      <p:grpSpPr>
-        <a:xfrm>
-          <a:off x="0" y="0"/>
-          <a:ext cx="0" cy="0"/>
-          <a:chOff x="0" y="0"/>
-          <a:chExt cx="0" cy="0"/>
-        </a:xfrm>
-      </p:grpSpPr>
-      <p:sp>
-        <p:nvSpPr>
-          <p:cNvPr id="2" name="Slide Image Placeholder 1"/>
-          <p:cNvSpPr>
-            <a:spLocks noGrp="1" noRot="1" noChangeAspect="1"/>
-          </p:cNvSpPr>
-          <p:nvPr>
-            <p:ph type="sldImg" idx="2"/>
-          </p:nvPr>
-        </p:nvSpPr>
-        <p:spPr/>
-      </p:sp>
-      <p:sp>
-        <p:nvSpPr>
-          <p:cNvPr id="3" name="Text Placeholder 2"/>
-          <p:cNvSpPr>
-            <a:spLocks noGrp="1"/>
-          </p:cNvSpPr>
-          <p:nvPr>
-            <p:ph type="body" idx="3"/>
-          </p:nvPr>
-        </p:nvSpPr>
-        <p:spPr/>
-        <p:txBody>
-          <a:bodyPr/>
-          <a:lstStyle/>
-          <a:p>
-            <a:endParaRPr lang="en-US"/>
-          </a:p>
-        </p:txBody>
-      </p:sp>
-    </p:spTree>
-  </p:cSld>
-  <p:clrMapOvr>
-    <a:masterClrMapping/>
-  </p:clrMapOvr>
-</p:notes>
-</file>
-
 <file path=ppt/slideLayouts/slideLayout1.xml><?xml version="1.0" encoding="utf-8"?>
 <p:sldLayout xmlns:a="http://schemas.openxmlformats.org/drawingml/2006/main" xmlns:r="http://schemas.openxmlformats.org/officeDocument/2006/relationships" xmlns:p="http://schemas.openxmlformats.org/presentationml/2006/main" showMasterSp="0" type="title" preserve="1">
   <p:cSld name="Title Slide">
@@ -9039,3184 +8980,6 @@
 </file>
 
 <file path=ppt/slides/slide1.xml><?xml version="1.0" encoding="utf-8"?>
-<p:sld xmlns:a="http://schemas.openxmlformats.org/drawingml/2006/main" xmlns:r="http://schemas.openxmlformats.org/officeDocument/2006/relationships" xmlns:p="http://schemas.openxmlformats.org/presentationml/2006/main">
-  <p:cSld>
-    <p:spTree>
-      <p:nvGrpSpPr>
-        <p:cNvPr id="1" name=""/>
-        <p:cNvGrpSpPr/>
-        <p:nvPr/>
-      </p:nvGrpSpPr>
-      <p:grpSpPr>
-        <a:xfrm>
-          <a:off x="0" y="0"/>
-          <a:ext cx="0" cy="0"/>
-          <a:chOff x="0" y="0"/>
-          <a:chExt cx="0" cy="0"/>
-        </a:xfrm>
-      </p:grpSpPr>
-      <p:sp>
-        <p:nvSpPr>
-          <p:cNvPr id="11" name="Text Box 10"/>
-          <p:cNvSpPr txBox="1"/>
-          <p:nvPr/>
-        </p:nvSpPr>
-        <p:spPr>
-          <a:xfrm>
-            <a:off x="3009901" y="255905"/>
-            <a:ext cx="6169660" cy="472440"/>
-          </a:xfrm>
-          <a:prstGeom prst="rect">
-            <a:avLst/>
-          </a:prstGeom>
-          <a:noFill/>
-        </p:spPr>
-        <p:txBody>
-          <a:bodyPr wrap="none" rtlCol="0" anchor="t">
-            <a:spAutoFit/>
-          </a:bodyPr>
-          <a:lstStyle/>
-          <a:p>
-            <a:pPr algn="ctr"/>
-            <a:r>
-              <a:rPr lang="en-US" sz="2500" b="1" i="1">
-                <a:solidFill>
-                  <a:srgbClr val="FF0000"/>
-                </a:solidFill>
-                <a:latin typeface="Times New Roman" panose="02020603050405020304" charset="0"/>
-                <a:sym typeface="+mn-ea"/>
-              </a:rPr>
-              <a:t>CHƯƠNG 3: CÀI ĐẶT VÀ THỰC NGHIỆM</a:t>
-            </a:r>
-          </a:p>
-        </p:txBody>
-      </p:sp>
-      <p:sp>
-        <p:nvSpPr>
-          <p:cNvPr id="17" name="Text Box 16"/>
-          <p:cNvSpPr txBox="1"/>
-          <p:nvPr/>
-        </p:nvSpPr>
-        <p:spPr>
-          <a:xfrm>
-            <a:off x="879475" y="1130619"/>
-            <a:ext cx="9234751" cy="396240"/>
-          </a:xfrm>
-          <a:prstGeom prst="rect">
-            <a:avLst/>
-          </a:prstGeom>
-        </p:spPr>
-        <p:style>
-          <a:lnRef idx="1">
-            <a:schemeClr val="accent3"/>
-          </a:lnRef>
-          <a:fillRef idx="3">
-            <a:schemeClr val="accent3"/>
-          </a:fillRef>
-          <a:effectRef idx="2">
-            <a:schemeClr val="accent3"/>
-          </a:effectRef>
-          <a:fontRef idx="minor">
-            <a:schemeClr val="lt1"/>
-          </a:fontRef>
-        </p:style>
-        <p:txBody>
-          <a:bodyPr wrap="square">
-            <a:spAutoFit/>
-          </a:bodyPr>
-          <a:lstStyle/>
-          <a:p>
-            <a:pPr marL="0" indent="0"/>
-            <a:r>
-              <a:rPr lang="en-US" sz="2000" b="1">
-                <a:solidFill>
-                  <a:srgbClr val="000000"/>
-                </a:solidFill>
-                <a:latin typeface="Times New Roman" panose="02020603050405020304" charset="0"/>
-                <a:ea typeface="Times New Roman" panose="02020603050405020304" charset="0"/>
-                <a:cs typeface="Times New Roman" panose="02020603050405020304" charset="0"/>
-                <a:sym typeface="+mn-ea"/>
-              </a:rPr>
-              <a:t>2) Thực nghiệm</a:t>
-            </a:r>
-          </a:p>
-        </p:txBody>
-      </p:sp>
-      <p:sp>
-        <p:nvSpPr>
-          <p:cNvPr id="2" name="Text Box 1"/>
-          <p:cNvSpPr txBox="1"/>
-          <p:nvPr/>
-        </p:nvSpPr>
-        <p:spPr>
-          <a:xfrm>
-            <a:off x="919480" y="1757045"/>
-            <a:ext cx="3390900" cy="365760"/>
-          </a:xfrm>
-          <a:prstGeom prst="rect">
-            <a:avLst/>
-          </a:prstGeom>
-          <a:noFill/>
-        </p:spPr>
-        <p:txBody>
-          <a:bodyPr wrap="square" rtlCol="0">
-            <a:spAutoFit/>
-          </a:bodyPr>
-          <a:lstStyle/>
-          <a:p>
-            <a:r>
-              <a:rPr lang="en-US">
-                <a:latin typeface="Times New Roman" panose="02020603050405020304" charset="0"/>
-              </a:rPr>
-              <a:t>2.2) Giao diện admin:</a:t>
-            </a:r>
-          </a:p>
-        </p:txBody>
-      </p:sp>
-      <p:sp>
-        <p:nvSpPr>
-          <p:cNvPr id="3" name="Text Box 2"/>
-          <p:cNvSpPr txBox="1"/>
-          <p:nvPr/>
-        </p:nvSpPr>
-        <p:spPr>
-          <a:xfrm>
-            <a:off x="919480" y="2274570"/>
-            <a:ext cx="2018665" cy="365760"/>
-          </a:xfrm>
-          <a:prstGeom prst="rect">
-            <a:avLst/>
-          </a:prstGeom>
-          <a:noFill/>
-        </p:spPr>
-        <p:txBody>
-          <a:bodyPr wrap="none" rtlCol="0" anchor="t">
-            <a:spAutoFit/>
-          </a:bodyPr>
-          <a:lstStyle/>
-          <a:p>
-            <a:pPr marL="285750" indent="-285750">
-              <a:buFont typeface="Wingdings" panose="05000000000000000000" charset="0"/>
-              <a:buChar char="ü"/>
-            </a:pPr>
-            <a:r>
-              <a:rPr lang="en-US">
-                <a:latin typeface="Times New Roman" panose="02020603050405020304" charset="0"/>
-                <a:sym typeface="+mn-ea"/>
-              </a:rPr>
-              <a:t> Quản lý tin tức:</a:t>
-            </a:r>
-            <a:endParaRPr lang="en-US"/>
-          </a:p>
-        </p:txBody>
-      </p:sp>
-      <p:sp>
-        <p:nvSpPr>
-          <p:cNvPr id="4" name="Text Box 3"/>
-          <p:cNvSpPr txBox="1"/>
-          <p:nvPr/>
-        </p:nvSpPr>
-        <p:spPr>
-          <a:xfrm>
-            <a:off x="7168515" y="2274570"/>
-            <a:ext cx="2694305" cy="365760"/>
-          </a:xfrm>
-          <a:prstGeom prst="rect">
-            <a:avLst/>
-          </a:prstGeom>
-          <a:noFill/>
-        </p:spPr>
-        <p:txBody>
-          <a:bodyPr wrap="none" rtlCol="0" anchor="t">
-            <a:spAutoFit/>
-          </a:bodyPr>
-          <a:lstStyle/>
-          <a:p>
-            <a:pPr marL="285750" indent="-285750">
-              <a:buFont typeface="Wingdings" panose="05000000000000000000" charset="0"/>
-              <a:buChar char="ü"/>
-            </a:pPr>
-            <a:r>
-              <a:rPr lang="en-US">
-                <a:latin typeface="Times New Roman" panose="02020603050405020304" charset="0"/>
-                <a:sym typeface="+mn-ea"/>
-              </a:rPr>
-              <a:t> Thêm, sửa, xóa tin tức:</a:t>
-            </a:r>
-            <a:endParaRPr lang="en-US"/>
-          </a:p>
-        </p:txBody>
-      </p:sp>
-      <p:pic>
-        <p:nvPicPr>
-          <p:cNvPr id="103" name="Picture 103"/>
-          <p:cNvPicPr>
-            <a:picLocks noGrp="1" noChangeAspect="1"/>
-          </p:cNvPicPr>
-          <p:nvPr>
-            <p:ph sz="half" idx="1"/>
-          </p:nvPr>
-        </p:nvPicPr>
-        <p:blipFill>
-          <a:blip r:embed="rId3" cstate="print">
-            <a:extLst>
-              <a:ext uri="{28A0092B-C50C-407E-A947-70E740481C1C}">
-                <a14:useLocalDpi xmlns:a14="http://schemas.microsoft.com/office/drawing/2010/main" val="0"/>
-              </a:ext>
-            </a:extLst>
-          </a:blip>
-          <a:stretch>
-            <a:fillRect/>
-          </a:stretch>
-        </p:blipFill>
-        <p:spPr>
-          <a:xfrm>
-            <a:off x="609600" y="2925445"/>
-            <a:ext cx="4582160" cy="2143125"/>
-          </a:xfrm>
-          <a:prstGeom prst="rect">
-            <a:avLst/>
-          </a:prstGeom>
-        </p:spPr>
-      </p:pic>
-      <p:pic>
-        <p:nvPicPr>
-          <p:cNvPr id="104" name="Picture 104"/>
-          <p:cNvPicPr>
-            <a:picLocks noGrp="1" noChangeAspect="1" noChangeArrowheads="1"/>
-          </p:cNvPicPr>
-          <p:nvPr>
-            <p:ph sz="half" idx="2"/>
-          </p:nvPr>
-        </p:nvPicPr>
-        <p:blipFill>
-          <a:blip r:embed="rId4" cstate="print">
-            <a:extLst>
-              <a:ext uri="{28A0092B-C50C-407E-A947-70E740481C1C}">
-                <a14:useLocalDpi xmlns:a14="http://schemas.microsoft.com/office/drawing/2010/main" val="0"/>
-              </a:ext>
-            </a:extLst>
-          </a:blip>
-          <a:srcRect/>
-          <a:stretch>
-            <a:fillRect/>
-          </a:stretch>
-        </p:blipFill>
-        <p:spPr>
-          <a:xfrm>
-            <a:off x="6388100" y="3044190"/>
-            <a:ext cx="4718685" cy="2024380"/>
-          </a:xfrm>
-          <a:prstGeom prst="rect">
-            <a:avLst/>
-          </a:prstGeom>
-          <a:noFill/>
-          <a:ln>
-            <a:noFill/>
-          </a:ln>
-        </p:spPr>
-      </p:pic>
-      <p:sp>
-        <p:nvSpPr>
-          <p:cNvPr id="8" name="Content Placeholder 2"/>
-          <p:cNvSpPr txBox="1"/>
-          <p:nvPr/>
-        </p:nvSpPr>
-        <p:spPr>
-          <a:xfrm>
-            <a:off x="889635" y="5387340"/>
-            <a:ext cx="4022725" cy="419100"/>
-          </a:xfrm>
-          <a:prstGeom prst="rect">
-            <a:avLst/>
-          </a:prstGeom>
-        </p:spPr>
-        <p:txBody>
-          <a:bodyPr vert="horz" lIns="91440" tIns="45720" rIns="91440" bIns="45720" rtlCol="0">
-            <a:normAutofit/>
-          </a:bodyPr>
-          <a:lstStyle>
-            <a:lvl1pPr marL="342900" indent="-342900" algn="l" defTabSz="457200" rtl="0" eaLnBrk="1" latinLnBrk="0" hangingPunct="1">
-              <a:spcBef>
-                <a:spcPts val="1000"/>
-              </a:spcBef>
-              <a:spcAft>
-                <a:spcPts val="0"/>
-              </a:spcAft>
-              <a:buClr>
-                <a:schemeClr val="accent1"/>
-              </a:buClr>
-              <a:buSzPct val="80000"/>
-              <a:buFont typeface="Wingdings 3" charset="2"/>
-              <a:buChar char=""/>
-              <a:defRPr sz="1800" b="0" i="0" kern="1200">
-                <a:solidFill>
-                  <a:schemeClr val="tx1">
-                    <a:lumMod val="75000"/>
-                    <a:lumOff val="25000"/>
-                  </a:schemeClr>
-                </a:solidFill>
-                <a:latin typeface="+mn-lt"/>
-                <a:ea typeface="+mn-ea"/>
-                <a:cs typeface="+mn-cs"/>
-              </a:defRPr>
-            </a:lvl1pPr>
-            <a:lvl2pPr marL="742950" indent="-285750" algn="l" defTabSz="457200" rtl="0" eaLnBrk="1" latinLnBrk="0" hangingPunct="1">
-              <a:spcBef>
-                <a:spcPts val="1000"/>
-              </a:spcBef>
-              <a:spcAft>
-                <a:spcPts val="0"/>
-              </a:spcAft>
-              <a:buClr>
-                <a:schemeClr val="accent1"/>
-              </a:buClr>
-              <a:buSzPct val="80000"/>
-              <a:buFont typeface="Wingdings 3" charset="2"/>
-              <a:buChar char=""/>
-              <a:defRPr sz="1600" b="0" i="0" kern="1200">
-                <a:solidFill>
-                  <a:schemeClr val="tx1">
-                    <a:lumMod val="75000"/>
-                    <a:lumOff val="25000"/>
-                  </a:schemeClr>
-                </a:solidFill>
-                <a:latin typeface="+mn-lt"/>
-                <a:ea typeface="+mn-ea"/>
-                <a:cs typeface="+mn-cs"/>
-              </a:defRPr>
-            </a:lvl2pPr>
-            <a:lvl3pPr marL="1143000" indent="-228600" algn="l" defTabSz="457200" rtl="0" eaLnBrk="1" latinLnBrk="0" hangingPunct="1">
-              <a:spcBef>
-                <a:spcPts val="1000"/>
-              </a:spcBef>
-              <a:spcAft>
-                <a:spcPts val="0"/>
-              </a:spcAft>
-              <a:buClr>
-                <a:schemeClr val="accent1"/>
-              </a:buClr>
-              <a:buSzPct val="80000"/>
-              <a:buFont typeface="Wingdings 3" charset="2"/>
-              <a:buChar char=""/>
-              <a:defRPr sz="1400" b="0" i="0" kern="1200">
-                <a:solidFill>
-                  <a:schemeClr val="tx1">
-                    <a:lumMod val="75000"/>
-                    <a:lumOff val="25000"/>
-                  </a:schemeClr>
-                </a:solidFill>
-                <a:latin typeface="+mn-lt"/>
-                <a:ea typeface="+mn-ea"/>
-                <a:cs typeface="+mn-cs"/>
-              </a:defRPr>
-            </a:lvl3pPr>
-            <a:lvl4pPr marL="1600200" indent="-228600" algn="l" defTabSz="457200" rtl="0" eaLnBrk="1" latinLnBrk="0" hangingPunct="1">
-              <a:spcBef>
-                <a:spcPts val="1000"/>
-              </a:spcBef>
-              <a:spcAft>
-                <a:spcPts val="0"/>
-              </a:spcAft>
-              <a:buClr>
-                <a:schemeClr val="accent1"/>
-              </a:buClr>
-              <a:buSzPct val="80000"/>
-              <a:buFont typeface="Wingdings 3" charset="2"/>
-              <a:buChar char=""/>
-              <a:defRPr sz="1200" b="0" i="0" kern="1200">
-                <a:solidFill>
-                  <a:schemeClr val="tx1">
-                    <a:lumMod val="75000"/>
-                    <a:lumOff val="25000"/>
-                  </a:schemeClr>
-                </a:solidFill>
-                <a:latin typeface="+mn-lt"/>
-                <a:ea typeface="+mn-ea"/>
-                <a:cs typeface="+mn-cs"/>
-              </a:defRPr>
-            </a:lvl4pPr>
-            <a:lvl5pPr marL="2057400" indent="-228600" algn="l" defTabSz="457200" rtl="0" eaLnBrk="1" latinLnBrk="0" hangingPunct="1">
-              <a:spcBef>
-                <a:spcPts val="1000"/>
-              </a:spcBef>
-              <a:spcAft>
-                <a:spcPts val="0"/>
-              </a:spcAft>
-              <a:buClr>
-                <a:schemeClr val="accent1"/>
-              </a:buClr>
-              <a:buSzPct val="80000"/>
-              <a:buFont typeface="Wingdings 3" charset="2"/>
-              <a:buChar char=""/>
-              <a:defRPr sz="1200" b="0" i="0" kern="1200">
-                <a:solidFill>
-                  <a:schemeClr val="tx1">
-                    <a:lumMod val="75000"/>
-                    <a:lumOff val="25000"/>
-                  </a:schemeClr>
-                </a:solidFill>
-                <a:latin typeface="+mn-lt"/>
-                <a:ea typeface="+mn-ea"/>
-                <a:cs typeface="+mn-cs"/>
-              </a:defRPr>
-            </a:lvl5pPr>
-            <a:lvl6pPr marL="2514600" indent="-228600" algn="l" defTabSz="457200" rtl="0" eaLnBrk="1" latinLnBrk="0" hangingPunct="1">
-              <a:spcBef>
-                <a:spcPts val="1000"/>
-              </a:spcBef>
-              <a:spcAft>
-                <a:spcPts val="0"/>
-              </a:spcAft>
-              <a:buClr>
-                <a:schemeClr val="accent1"/>
-              </a:buClr>
-              <a:buSzPct val="80000"/>
-              <a:buFont typeface="Wingdings 3" charset="2"/>
-              <a:buChar char=""/>
-              <a:defRPr sz="1200" b="0" i="0" kern="1200">
-                <a:solidFill>
-                  <a:schemeClr val="tx1">
-                    <a:lumMod val="75000"/>
-                    <a:lumOff val="25000"/>
-                  </a:schemeClr>
-                </a:solidFill>
-                <a:latin typeface="+mn-lt"/>
-                <a:ea typeface="+mn-ea"/>
-                <a:cs typeface="+mn-cs"/>
-              </a:defRPr>
-            </a:lvl6pPr>
-            <a:lvl7pPr marL="2971800" indent="-228600" algn="l" defTabSz="457200" rtl="0" eaLnBrk="1" latinLnBrk="0" hangingPunct="1">
-              <a:spcBef>
-                <a:spcPts val="1000"/>
-              </a:spcBef>
-              <a:spcAft>
-                <a:spcPts val="0"/>
-              </a:spcAft>
-              <a:buClr>
-                <a:schemeClr val="accent1"/>
-              </a:buClr>
-              <a:buSzPct val="80000"/>
-              <a:buFont typeface="Wingdings 3" charset="2"/>
-              <a:buChar char=""/>
-              <a:defRPr sz="1200" b="0" i="0" kern="1200">
-                <a:solidFill>
-                  <a:schemeClr val="tx1">
-                    <a:lumMod val="75000"/>
-                    <a:lumOff val="25000"/>
-                  </a:schemeClr>
-                </a:solidFill>
-                <a:latin typeface="+mn-lt"/>
-                <a:ea typeface="+mn-ea"/>
-                <a:cs typeface="+mn-cs"/>
-              </a:defRPr>
-            </a:lvl7pPr>
-            <a:lvl8pPr marL="3429000" indent="-228600" algn="l" defTabSz="457200" rtl="0" eaLnBrk="1" latinLnBrk="0" hangingPunct="1">
-              <a:spcBef>
-                <a:spcPts val="1000"/>
-              </a:spcBef>
-              <a:spcAft>
-                <a:spcPts val="0"/>
-              </a:spcAft>
-              <a:buClr>
-                <a:schemeClr val="accent1"/>
-              </a:buClr>
-              <a:buSzPct val="80000"/>
-              <a:buFont typeface="Wingdings 3" charset="2"/>
-              <a:buChar char=""/>
-              <a:defRPr sz="1200" b="0" i="0" kern="1200">
-                <a:solidFill>
-                  <a:schemeClr val="tx1">
-                    <a:lumMod val="75000"/>
-                    <a:lumOff val="25000"/>
-                  </a:schemeClr>
-                </a:solidFill>
-                <a:latin typeface="+mn-lt"/>
-                <a:ea typeface="+mn-ea"/>
-                <a:cs typeface="+mn-cs"/>
-              </a:defRPr>
-            </a:lvl8pPr>
-            <a:lvl9pPr marL="3886200" indent="-228600" algn="l" defTabSz="457200" rtl="0" eaLnBrk="1" latinLnBrk="0" hangingPunct="1">
-              <a:spcBef>
-                <a:spcPts val="1000"/>
-              </a:spcBef>
-              <a:spcAft>
-                <a:spcPts val="0"/>
-              </a:spcAft>
-              <a:buClr>
-                <a:schemeClr val="accent1"/>
-              </a:buClr>
-              <a:buSzPct val="80000"/>
-              <a:buFont typeface="Wingdings 3" charset="2"/>
-              <a:buChar char=""/>
-              <a:defRPr sz="1200" b="0" i="0" kern="1200">
-                <a:solidFill>
-                  <a:schemeClr val="tx1">
-                    <a:lumMod val="75000"/>
-                    <a:lumOff val="25000"/>
-                  </a:schemeClr>
-                </a:solidFill>
-                <a:latin typeface="+mn-lt"/>
-                <a:ea typeface="+mn-ea"/>
-                <a:cs typeface="+mn-cs"/>
-              </a:defRPr>
-            </a:lvl9pPr>
-          </a:lstStyle>
-          <a:p>
-            <a:pPr marL="0" indent="0">
-              <a:buNone/>
-            </a:pPr>
-            <a:r>
-              <a:rPr lang="en-US" sz="1500" i="1" dirty="0" err="1">
-                <a:solidFill>
-                  <a:schemeClr val="tx1"/>
-                </a:solidFill>
-                <a:latin typeface="Times New Roman" panose="02020603050405020304" charset="0"/>
-                <a:cs typeface="Times New Roman" panose="02020603050405020304" charset="0"/>
-              </a:rPr>
-              <a:t>Hình</a:t>
-            </a:r>
-            <a:r>
-              <a:rPr lang="en-US" sz="1500" i="1" dirty="0">
-                <a:solidFill>
-                  <a:schemeClr val="tx1"/>
-                </a:solidFill>
-                <a:latin typeface="Times New Roman" panose="02020603050405020304" charset="0"/>
-                <a:cs typeface="Times New Roman" panose="02020603050405020304" charset="0"/>
-              </a:rPr>
-              <a:t>. Form quản lý tin tức.</a:t>
-            </a:r>
-          </a:p>
-        </p:txBody>
-      </p:sp>
-      <p:sp>
-        <p:nvSpPr>
-          <p:cNvPr id="9" name="Content Placeholder 2"/>
-          <p:cNvSpPr txBox="1"/>
-          <p:nvPr/>
-        </p:nvSpPr>
-        <p:spPr>
-          <a:xfrm>
-            <a:off x="6736080" y="5387340"/>
-            <a:ext cx="4022725" cy="419100"/>
-          </a:xfrm>
-          <a:prstGeom prst="rect">
-            <a:avLst/>
-          </a:prstGeom>
-        </p:spPr>
-        <p:txBody>
-          <a:bodyPr vert="horz" lIns="91440" tIns="45720" rIns="91440" bIns="45720" rtlCol="0">
-            <a:normAutofit/>
-          </a:bodyPr>
-          <a:lstStyle>
-            <a:lvl1pPr marL="342900" indent="-342900" algn="l" defTabSz="457200" rtl="0" eaLnBrk="1" latinLnBrk="0" hangingPunct="1">
-              <a:spcBef>
-                <a:spcPts val="1000"/>
-              </a:spcBef>
-              <a:spcAft>
-                <a:spcPts val="0"/>
-              </a:spcAft>
-              <a:buClr>
-                <a:schemeClr val="accent1"/>
-              </a:buClr>
-              <a:buSzPct val="80000"/>
-              <a:buFont typeface="Wingdings 3" charset="2"/>
-              <a:buChar char=""/>
-              <a:defRPr sz="1800" b="0" i="0" kern="1200">
-                <a:solidFill>
-                  <a:schemeClr val="tx1">
-                    <a:lumMod val="75000"/>
-                    <a:lumOff val="25000"/>
-                  </a:schemeClr>
-                </a:solidFill>
-                <a:latin typeface="+mn-lt"/>
-                <a:ea typeface="+mn-ea"/>
-                <a:cs typeface="+mn-cs"/>
-              </a:defRPr>
-            </a:lvl1pPr>
-            <a:lvl2pPr marL="742950" indent="-285750" algn="l" defTabSz="457200" rtl="0" eaLnBrk="1" latinLnBrk="0" hangingPunct="1">
-              <a:spcBef>
-                <a:spcPts val="1000"/>
-              </a:spcBef>
-              <a:spcAft>
-                <a:spcPts val="0"/>
-              </a:spcAft>
-              <a:buClr>
-                <a:schemeClr val="accent1"/>
-              </a:buClr>
-              <a:buSzPct val="80000"/>
-              <a:buFont typeface="Wingdings 3" charset="2"/>
-              <a:buChar char=""/>
-              <a:defRPr sz="1600" b="0" i="0" kern="1200">
-                <a:solidFill>
-                  <a:schemeClr val="tx1">
-                    <a:lumMod val="75000"/>
-                    <a:lumOff val="25000"/>
-                  </a:schemeClr>
-                </a:solidFill>
-                <a:latin typeface="+mn-lt"/>
-                <a:ea typeface="+mn-ea"/>
-                <a:cs typeface="+mn-cs"/>
-              </a:defRPr>
-            </a:lvl2pPr>
-            <a:lvl3pPr marL="1143000" indent="-228600" algn="l" defTabSz="457200" rtl="0" eaLnBrk="1" latinLnBrk="0" hangingPunct="1">
-              <a:spcBef>
-                <a:spcPts val="1000"/>
-              </a:spcBef>
-              <a:spcAft>
-                <a:spcPts val="0"/>
-              </a:spcAft>
-              <a:buClr>
-                <a:schemeClr val="accent1"/>
-              </a:buClr>
-              <a:buSzPct val="80000"/>
-              <a:buFont typeface="Wingdings 3" charset="2"/>
-              <a:buChar char=""/>
-              <a:defRPr sz="1400" b="0" i="0" kern="1200">
-                <a:solidFill>
-                  <a:schemeClr val="tx1">
-                    <a:lumMod val="75000"/>
-                    <a:lumOff val="25000"/>
-                  </a:schemeClr>
-                </a:solidFill>
-                <a:latin typeface="+mn-lt"/>
-                <a:ea typeface="+mn-ea"/>
-                <a:cs typeface="+mn-cs"/>
-              </a:defRPr>
-            </a:lvl3pPr>
-            <a:lvl4pPr marL="1600200" indent="-228600" algn="l" defTabSz="457200" rtl="0" eaLnBrk="1" latinLnBrk="0" hangingPunct="1">
-              <a:spcBef>
-                <a:spcPts val="1000"/>
-              </a:spcBef>
-              <a:spcAft>
-                <a:spcPts val="0"/>
-              </a:spcAft>
-              <a:buClr>
-                <a:schemeClr val="accent1"/>
-              </a:buClr>
-              <a:buSzPct val="80000"/>
-              <a:buFont typeface="Wingdings 3" charset="2"/>
-              <a:buChar char=""/>
-              <a:defRPr sz="1200" b="0" i="0" kern="1200">
-                <a:solidFill>
-                  <a:schemeClr val="tx1">
-                    <a:lumMod val="75000"/>
-                    <a:lumOff val="25000"/>
-                  </a:schemeClr>
-                </a:solidFill>
-                <a:latin typeface="+mn-lt"/>
-                <a:ea typeface="+mn-ea"/>
-                <a:cs typeface="+mn-cs"/>
-              </a:defRPr>
-            </a:lvl4pPr>
-            <a:lvl5pPr marL="2057400" indent="-228600" algn="l" defTabSz="457200" rtl="0" eaLnBrk="1" latinLnBrk="0" hangingPunct="1">
-              <a:spcBef>
-                <a:spcPts val="1000"/>
-              </a:spcBef>
-              <a:spcAft>
-                <a:spcPts val="0"/>
-              </a:spcAft>
-              <a:buClr>
-                <a:schemeClr val="accent1"/>
-              </a:buClr>
-              <a:buSzPct val="80000"/>
-              <a:buFont typeface="Wingdings 3" charset="2"/>
-              <a:buChar char=""/>
-              <a:defRPr sz="1200" b="0" i="0" kern="1200">
-                <a:solidFill>
-                  <a:schemeClr val="tx1">
-                    <a:lumMod val="75000"/>
-                    <a:lumOff val="25000"/>
-                  </a:schemeClr>
-                </a:solidFill>
-                <a:latin typeface="+mn-lt"/>
-                <a:ea typeface="+mn-ea"/>
-                <a:cs typeface="+mn-cs"/>
-              </a:defRPr>
-            </a:lvl5pPr>
-            <a:lvl6pPr marL="2514600" indent="-228600" algn="l" defTabSz="457200" rtl="0" eaLnBrk="1" latinLnBrk="0" hangingPunct="1">
-              <a:spcBef>
-                <a:spcPts val="1000"/>
-              </a:spcBef>
-              <a:spcAft>
-                <a:spcPts val="0"/>
-              </a:spcAft>
-              <a:buClr>
-                <a:schemeClr val="accent1"/>
-              </a:buClr>
-              <a:buSzPct val="80000"/>
-              <a:buFont typeface="Wingdings 3" charset="2"/>
-              <a:buChar char=""/>
-              <a:defRPr sz="1200" b="0" i="0" kern="1200">
-                <a:solidFill>
-                  <a:schemeClr val="tx1">
-                    <a:lumMod val="75000"/>
-                    <a:lumOff val="25000"/>
-                  </a:schemeClr>
-                </a:solidFill>
-                <a:latin typeface="+mn-lt"/>
-                <a:ea typeface="+mn-ea"/>
-                <a:cs typeface="+mn-cs"/>
-              </a:defRPr>
-            </a:lvl6pPr>
-            <a:lvl7pPr marL="2971800" indent="-228600" algn="l" defTabSz="457200" rtl="0" eaLnBrk="1" latinLnBrk="0" hangingPunct="1">
-              <a:spcBef>
-                <a:spcPts val="1000"/>
-              </a:spcBef>
-              <a:spcAft>
-                <a:spcPts val="0"/>
-              </a:spcAft>
-              <a:buClr>
-                <a:schemeClr val="accent1"/>
-              </a:buClr>
-              <a:buSzPct val="80000"/>
-              <a:buFont typeface="Wingdings 3" charset="2"/>
-              <a:buChar char=""/>
-              <a:defRPr sz="1200" b="0" i="0" kern="1200">
-                <a:solidFill>
-                  <a:schemeClr val="tx1">
-                    <a:lumMod val="75000"/>
-                    <a:lumOff val="25000"/>
-                  </a:schemeClr>
-                </a:solidFill>
-                <a:latin typeface="+mn-lt"/>
-                <a:ea typeface="+mn-ea"/>
-                <a:cs typeface="+mn-cs"/>
-              </a:defRPr>
-            </a:lvl7pPr>
-            <a:lvl8pPr marL="3429000" indent="-228600" algn="l" defTabSz="457200" rtl="0" eaLnBrk="1" latinLnBrk="0" hangingPunct="1">
-              <a:spcBef>
-                <a:spcPts val="1000"/>
-              </a:spcBef>
-              <a:spcAft>
-                <a:spcPts val="0"/>
-              </a:spcAft>
-              <a:buClr>
-                <a:schemeClr val="accent1"/>
-              </a:buClr>
-              <a:buSzPct val="80000"/>
-              <a:buFont typeface="Wingdings 3" charset="2"/>
-              <a:buChar char=""/>
-              <a:defRPr sz="1200" b="0" i="0" kern="1200">
-                <a:solidFill>
-                  <a:schemeClr val="tx1">
-                    <a:lumMod val="75000"/>
-                    <a:lumOff val="25000"/>
-                  </a:schemeClr>
-                </a:solidFill>
-                <a:latin typeface="+mn-lt"/>
-                <a:ea typeface="+mn-ea"/>
-                <a:cs typeface="+mn-cs"/>
-              </a:defRPr>
-            </a:lvl8pPr>
-            <a:lvl9pPr marL="3886200" indent="-228600" algn="l" defTabSz="457200" rtl="0" eaLnBrk="1" latinLnBrk="0" hangingPunct="1">
-              <a:spcBef>
-                <a:spcPts val="1000"/>
-              </a:spcBef>
-              <a:spcAft>
-                <a:spcPts val="0"/>
-              </a:spcAft>
-              <a:buClr>
-                <a:schemeClr val="accent1"/>
-              </a:buClr>
-              <a:buSzPct val="80000"/>
-              <a:buFont typeface="Wingdings 3" charset="2"/>
-              <a:buChar char=""/>
-              <a:defRPr sz="1200" b="0" i="0" kern="1200">
-                <a:solidFill>
-                  <a:schemeClr val="tx1">
-                    <a:lumMod val="75000"/>
-                    <a:lumOff val="25000"/>
-                  </a:schemeClr>
-                </a:solidFill>
-                <a:latin typeface="+mn-lt"/>
-                <a:ea typeface="+mn-ea"/>
-                <a:cs typeface="+mn-cs"/>
-              </a:defRPr>
-            </a:lvl9pPr>
-          </a:lstStyle>
-          <a:p>
-            <a:pPr marL="0" indent="0">
-              <a:buNone/>
-            </a:pPr>
-            <a:r>
-              <a:rPr lang="en-US" sz="1500" i="1" dirty="0" err="1">
-                <a:solidFill>
-                  <a:schemeClr val="tx1"/>
-                </a:solidFill>
-                <a:latin typeface="Times New Roman" panose="02020603050405020304" charset="0"/>
-                <a:cs typeface="Times New Roman" panose="02020603050405020304" charset="0"/>
-              </a:rPr>
-              <a:t>Hình</a:t>
-            </a:r>
-            <a:r>
-              <a:rPr lang="en-US" sz="1500" i="1" dirty="0">
-                <a:solidFill>
-                  <a:schemeClr val="tx1"/>
-                </a:solidFill>
-                <a:latin typeface="Times New Roman" panose="02020603050405020304" charset="0"/>
-                <a:cs typeface="Times New Roman" panose="02020603050405020304" charset="0"/>
-              </a:rPr>
-              <a:t>. Form quản lý thêm tin tức.</a:t>
-            </a:r>
-          </a:p>
-        </p:txBody>
-      </p:sp>
-    </p:spTree>
-  </p:cSld>
-  <p:clrMapOvr>
-    <a:masterClrMapping/>
-  </p:clrMapOvr>
-  <p:timing>
-    <p:tnLst>
-      <p:par>
-        <p:cTn id="1" dur="indefinite" restart="never" nodeType="tmRoot"/>
-      </p:par>
-    </p:tnLst>
-  </p:timing>
-</p:sld>
-</file>
-
-<file path=ppt/slides/slide2.xml><?xml version="1.0" encoding="utf-8"?>
-<p:sld xmlns:a="http://schemas.openxmlformats.org/drawingml/2006/main" xmlns:r="http://schemas.openxmlformats.org/officeDocument/2006/relationships" xmlns:p="http://schemas.openxmlformats.org/presentationml/2006/main">
-  <p:cSld>
-    <p:spTree>
-      <p:nvGrpSpPr>
-        <p:cNvPr id="1" name=""/>
-        <p:cNvGrpSpPr/>
-        <p:nvPr/>
-      </p:nvGrpSpPr>
-      <p:grpSpPr>
-        <a:xfrm>
-          <a:off x="0" y="0"/>
-          <a:ext cx="0" cy="0"/>
-          <a:chOff x="0" y="0"/>
-          <a:chExt cx="0" cy="0"/>
-        </a:xfrm>
-      </p:grpSpPr>
-      <p:sp>
-        <p:nvSpPr>
-          <p:cNvPr id="12" name="Title 1"/>
-          <p:cNvSpPr txBox="1"/>
-          <p:nvPr/>
-        </p:nvSpPr>
-        <p:spPr>
-          <a:xfrm>
-            <a:off x="1242168" y="194259"/>
-            <a:ext cx="8761413" cy="728480"/>
-          </a:xfrm>
-          <a:prstGeom prst="rect">
-            <a:avLst/>
-          </a:prstGeom>
-          <a:effectLst/>
-        </p:spPr>
-        <p:txBody>
-          <a:bodyPr vert="horz" lIns="91440" tIns="45720" rIns="91440" bIns="45720" rtlCol="0" anchor="ctr">
-            <a:normAutofit/>
-          </a:bodyPr>
-          <a:lstStyle>
-            <a:lvl1pPr algn="ctr" defTabSz="457200" rtl="0" eaLnBrk="1" latinLnBrk="0" hangingPunct="1">
-              <a:spcBef>
-                <a:spcPct val="0"/>
-              </a:spcBef>
-              <a:buNone/>
-              <a:defRPr sz="4000" kern="1200" cap="none">
-                <a:ln w="3175" cmpd="sng">
-                  <a:noFill/>
-                </a:ln>
-                <a:solidFill>
-                  <a:schemeClr val="tx1"/>
-                </a:solidFill>
-                <a:effectLst/>
-                <a:latin typeface="+mj-lt"/>
-                <a:ea typeface="+mj-ea"/>
-                <a:cs typeface="+mj-cs"/>
-              </a:defRPr>
-            </a:lvl1pPr>
-            <a:lvl2pPr eaLnBrk="1" hangingPunct="1">
-              <a:defRPr>
-                <a:solidFill>
-                  <a:schemeClr val="tx2"/>
-                </a:solidFill>
-              </a:defRPr>
-            </a:lvl2pPr>
-            <a:lvl3pPr eaLnBrk="1" hangingPunct="1">
-              <a:defRPr>
-                <a:solidFill>
-                  <a:schemeClr val="tx2"/>
-                </a:solidFill>
-              </a:defRPr>
-            </a:lvl3pPr>
-            <a:lvl4pPr eaLnBrk="1" hangingPunct="1">
-              <a:defRPr>
-                <a:solidFill>
-                  <a:schemeClr val="tx2"/>
-                </a:solidFill>
-              </a:defRPr>
-            </a:lvl4pPr>
-            <a:lvl5pPr eaLnBrk="1" hangingPunct="1">
-              <a:defRPr>
-                <a:solidFill>
-                  <a:schemeClr val="tx2"/>
-                </a:solidFill>
-              </a:defRPr>
-            </a:lvl5pPr>
-            <a:lvl6pPr eaLnBrk="1" hangingPunct="1">
-              <a:defRPr>
-                <a:solidFill>
-                  <a:schemeClr val="tx2"/>
-                </a:solidFill>
-              </a:defRPr>
-            </a:lvl6pPr>
-            <a:lvl7pPr eaLnBrk="1" hangingPunct="1">
-              <a:defRPr>
-                <a:solidFill>
-                  <a:schemeClr val="tx2"/>
-                </a:solidFill>
-              </a:defRPr>
-            </a:lvl7pPr>
-            <a:lvl8pPr eaLnBrk="1" hangingPunct="1">
-              <a:defRPr>
-                <a:solidFill>
-                  <a:schemeClr val="tx2"/>
-                </a:solidFill>
-              </a:defRPr>
-            </a:lvl8pPr>
-            <a:lvl9pPr eaLnBrk="1" hangingPunct="1">
-              <a:defRPr>
-                <a:solidFill>
-                  <a:schemeClr val="tx2"/>
-                </a:solidFill>
-              </a:defRPr>
-            </a:lvl9pPr>
-          </a:lstStyle>
-          <a:p>
-            <a:r>
-              <a:rPr lang="en-US" sz="2500" b="1" i="1" dirty="0">
-                <a:solidFill>
-                  <a:srgbClr val="FF0000"/>
-                </a:solidFill>
-                <a:effectLst/>
-                <a:latin typeface="Times New Roman" panose="02020603050405020304" charset="0"/>
-                <a:cs typeface="Times New Roman" panose="02020603050405020304" charset="0"/>
-              </a:rPr>
-              <a:t>CH</a:t>
-            </a:r>
-            <a:r>
-              <a:rPr lang="vi-VN" sz="2500" b="1" i="1" dirty="0">
-                <a:solidFill>
-                  <a:srgbClr val="FF0000"/>
-                </a:solidFill>
-                <a:effectLst/>
-                <a:latin typeface="Times New Roman" panose="02020603050405020304" charset="0"/>
-                <a:cs typeface="Times New Roman" panose="02020603050405020304" charset="0"/>
-              </a:rPr>
-              <a:t>Ư</a:t>
-            </a:r>
-            <a:r>
-              <a:rPr lang="en-US" sz="2500" b="1" i="1" dirty="0">
-                <a:solidFill>
-                  <a:srgbClr val="FF0000"/>
-                </a:solidFill>
-                <a:effectLst/>
-                <a:latin typeface="Times New Roman" panose="02020603050405020304" charset="0"/>
-                <a:cs typeface="Times New Roman" panose="02020603050405020304" charset="0"/>
-              </a:rPr>
-              <a:t>ƠNG 4 : ĐÁNH GIÁ VÀ KẾT LUẬN</a:t>
-            </a:r>
-          </a:p>
-        </p:txBody>
-      </p:sp>
-      <p:grpSp>
-        <p:nvGrpSpPr>
-          <p:cNvPr id="2" name="Group 1"/>
-          <p:cNvGrpSpPr/>
-          <p:nvPr/>
-        </p:nvGrpSpPr>
-        <p:grpSpPr>
-          <a:xfrm>
-            <a:off x="1018650" y="2037164"/>
-            <a:ext cx="7336762" cy="3416300"/>
-            <a:chOff x="1008407" y="2974562"/>
-            <a:chExt cx="7336762" cy="3416300"/>
-          </a:xfrm>
-        </p:grpSpPr>
-        <p:sp>
-          <p:nvSpPr>
-            <p:cNvPr id="3" name="Arrow: Right 2"/>
-            <p:cNvSpPr/>
-            <p:nvPr/>
-          </p:nvSpPr>
-          <p:spPr>
-            <a:xfrm>
-              <a:off x="1008407" y="2974562"/>
-              <a:ext cx="6812583" cy="3416300"/>
-            </a:xfrm>
-            <a:prstGeom prst="rightArrow">
-              <a:avLst/>
-            </a:prstGeom>
-          </p:spPr>
-          <p:style>
-            <a:lnRef idx="0">
-              <a:schemeClr val="accent1">
-                <a:hueOff val="0"/>
-                <a:satOff val="0"/>
-                <a:lumOff val="0"/>
-                <a:alphaOff val="0"/>
-              </a:schemeClr>
-            </a:lnRef>
-            <a:fillRef idx="1">
-              <a:schemeClr val="accent1">
-                <a:tint val="40000"/>
-                <a:hueOff val="0"/>
-                <a:satOff val="0"/>
-                <a:lumOff val="0"/>
-                <a:alphaOff val="0"/>
-              </a:schemeClr>
-            </a:fillRef>
-            <a:effectRef idx="0">
-              <a:schemeClr val="accent1">
-                <a:tint val="40000"/>
-                <a:hueOff val="0"/>
-                <a:satOff val="0"/>
-                <a:lumOff val="0"/>
-                <a:alphaOff val="0"/>
-              </a:schemeClr>
-            </a:effectRef>
-            <a:fontRef idx="minor">
-              <a:schemeClr val="dk1">
-                <a:hueOff val="0"/>
-                <a:satOff val="0"/>
-                <a:lumOff val="0"/>
-                <a:alphaOff val="0"/>
-              </a:schemeClr>
-            </a:fontRef>
-          </p:style>
-        </p:sp>
-        <p:sp>
-          <p:nvSpPr>
-            <p:cNvPr id="6" name="Freeform: Shape 5"/>
-            <p:cNvSpPr/>
-            <p:nvPr/>
-          </p:nvSpPr>
-          <p:spPr>
-            <a:xfrm>
-              <a:off x="1290430" y="3999452"/>
-              <a:ext cx="1971521" cy="1366520"/>
-            </a:xfrm>
-            <a:custGeom>
-              <a:avLst/>
-              <a:gdLst>
-                <a:gd name="connsiteX0" fmla="*/ 0 w 1971521"/>
-                <a:gd name="connsiteY0" fmla="*/ 227758 h 1366520"/>
-                <a:gd name="connsiteX1" fmla="*/ 227758 w 1971521"/>
-                <a:gd name="connsiteY1" fmla="*/ 0 h 1366520"/>
-                <a:gd name="connsiteX2" fmla="*/ 1743763 w 1971521"/>
-                <a:gd name="connsiteY2" fmla="*/ 0 h 1366520"/>
-                <a:gd name="connsiteX3" fmla="*/ 1971521 w 1971521"/>
-                <a:gd name="connsiteY3" fmla="*/ 227758 h 1366520"/>
-                <a:gd name="connsiteX4" fmla="*/ 1971521 w 1971521"/>
-                <a:gd name="connsiteY4" fmla="*/ 1138762 h 1366520"/>
-                <a:gd name="connsiteX5" fmla="*/ 1743763 w 1971521"/>
-                <a:gd name="connsiteY5" fmla="*/ 1366520 h 1366520"/>
-                <a:gd name="connsiteX6" fmla="*/ 227758 w 1971521"/>
-                <a:gd name="connsiteY6" fmla="*/ 1366520 h 1366520"/>
-                <a:gd name="connsiteX7" fmla="*/ 0 w 1971521"/>
-                <a:gd name="connsiteY7" fmla="*/ 1138762 h 1366520"/>
-                <a:gd name="connsiteX8" fmla="*/ 0 w 1971521"/>
-                <a:gd name="connsiteY8" fmla="*/ 227758 h 1366520"/>
-              </a:gdLst>
-              <a:ahLst/>
-              <a:cxnLst>
-                <a:cxn ang="0">
-                  <a:pos x="connsiteX0" y="connsiteY0"/>
-                </a:cxn>
-                <a:cxn ang="0">
-                  <a:pos x="connsiteX1" y="connsiteY1"/>
-                </a:cxn>
-                <a:cxn ang="0">
-                  <a:pos x="connsiteX2" y="connsiteY2"/>
-                </a:cxn>
-                <a:cxn ang="0">
-                  <a:pos x="connsiteX3" y="connsiteY3"/>
-                </a:cxn>
-                <a:cxn ang="0">
-                  <a:pos x="connsiteX4" y="connsiteY4"/>
-                </a:cxn>
-                <a:cxn ang="0">
-                  <a:pos x="connsiteX5" y="connsiteY5"/>
-                </a:cxn>
-                <a:cxn ang="0">
-                  <a:pos x="connsiteX6" y="connsiteY6"/>
-                </a:cxn>
-                <a:cxn ang="0">
-                  <a:pos x="connsiteX7" y="connsiteY7"/>
-                </a:cxn>
-                <a:cxn ang="0">
-                  <a:pos x="connsiteX8" y="connsiteY8"/>
-                </a:cxn>
-              </a:cxnLst>
-              <a:rect l="l" t="t" r="r" b="b"/>
-              <a:pathLst>
-                <a:path w="1971521" h="1366520">
-                  <a:moveTo>
-                    <a:pt x="0" y="227758"/>
-                  </a:moveTo>
-                  <a:cubicBezTo>
-                    <a:pt x="0" y="101971"/>
-                    <a:pt x="101971" y="0"/>
-                    <a:pt x="227758" y="0"/>
-                  </a:cubicBezTo>
-                  <a:lnTo>
-                    <a:pt x="1743763" y="0"/>
-                  </a:lnTo>
-                  <a:cubicBezTo>
-                    <a:pt x="1869550" y="0"/>
-                    <a:pt x="1971521" y="101971"/>
-                    <a:pt x="1971521" y="227758"/>
-                  </a:cubicBezTo>
-                  <a:lnTo>
-                    <a:pt x="1971521" y="1138762"/>
-                  </a:lnTo>
-                  <a:cubicBezTo>
-                    <a:pt x="1971521" y="1264549"/>
-                    <a:pt x="1869550" y="1366520"/>
-                    <a:pt x="1743763" y="1366520"/>
-                  </a:cubicBezTo>
-                  <a:lnTo>
-                    <a:pt x="227758" y="1366520"/>
-                  </a:lnTo>
-                  <a:cubicBezTo>
-                    <a:pt x="101971" y="1366520"/>
-                    <a:pt x="0" y="1264549"/>
-                    <a:pt x="0" y="1138762"/>
-                  </a:cubicBezTo>
-                  <a:lnTo>
-                    <a:pt x="0" y="227758"/>
-                  </a:lnTo>
-                  <a:close/>
-                </a:path>
-              </a:pathLst>
-            </a:custGeom>
-          </p:spPr>
-          <p:style>
-            <a:lnRef idx="2">
-              <a:schemeClr val="lt1">
-                <a:hueOff val="0"/>
-                <a:satOff val="0"/>
-                <a:lumOff val="0"/>
-                <a:alphaOff val="0"/>
-              </a:schemeClr>
-            </a:lnRef>
-            <a:fillRef idx="1">
-              <a:schemeClr val="accent1">
-                <a:hueOff val="0"/>
-                <a:satOff val="0"/>
-                <a:lumOff val="0"/>
-                <a:alphaOff val="0"/>
-              </a:schemeClr>
-            </a:fillRef>
-            <a:effectRef idx="0">
-              <a:schemeClr val="accent1">
-                <a:hueOff val="0"/>
-                <a:satOff val="0"/>
-                <a:lumOff val="0"/>
-                <a:alphaOff val="0"/>
-              </a:schemeClr>
-            </a:effectRef>
-            <a:fontRef idx="minor">
-              <a:schemeClr val="lt1"/>
-            </a:fontRef>
-          </p:style>
-          <p:txBody>
-            <a:bodyPr spcFirstLastPara="0" vert="horz" wrap="square" lIns="127668" tIns="127668" rIns="127668" bIns="127668" numCol="1" spcCol="1270" anchor="ctr" anchorCtr="0">
-              <a:noAutofit/>
-            </a:bodyPr>
-            <a:lstStyle/>
-            <a:p>
-              <a:pPr marL="0" lvl="0" indent="0" algn="ctr" defTabSz="711200">
-                <a:lnSpc>
-                  <a:spcPct val="90000"/>
-                </a:lnSpc>
-                <a:spcBef>
-                  <a:spcPct val="0"/>
-                </a:spcBef>
-                <a:spcAft>
-                  <a:spcPct val="35000"/>
-                </a:spcAft>
-                <a:buNone/>
-              </a:pPr>
-              <a:r>
-                <a:rPr lang="en-US" sz="1600" kern="1200" dirty="0" err="1">
-                  <a:latin typeface="Arial" panose="020B0604020202020204" pitchFamily="34" charset="0"/>
-                  <a:cs typeface="Arial" panose="020B0604020202020204" pitchFamily="34" charset="0"/>
-                </a:rPr>
-                <a:t>Bố</a:t>
-              </a:r>
-              <a:r>
-                <a:rPr lang="en-US" sz="1600" kern="1200" dirty="0">
-                  <a:latin typeface="Arial" panose="020B0604020202020204" pitchFamily="34" charset="0"/>
-                  <a:cs typeface="Arial" panose="020B0604020202020204" pitchFamily="34" charset="0"/>
-                </a:rPr>
-                <a:t> </a:t>
-              </a:r>
-              <a:r>
-                <a:rPr lang="en-US" sz="1600" kern="1200" dirty="0" err="1">
-                  <a:latin typeface="Arial" panose="020B0604020202020204" pitchFamily="34" charset="0"/>
-                  <a:cs typeface="Arial" panose="020B0604020202020204" pitchFamily="34" charset="0"/>
-                </a:rPr>
-                <a:t>cục</a:t>
-              </a:r>
-              <a:r>
-                <a:rPr lang="en-US" sz="1600" kern="1200" dirty="0">
-                  <a:latin typeface="Arial" panose="020B0604020202020204" pitchFamily="34" charset="0"/>
-                  <a:cs typeface="Arial" panose="020B0604020202020204" pitchFamily="34" charset="0"/>
-                </a:rPr>
-                <a:t> </a:t>
-              </a:r>
-              <a:r>
-                <a:rPr lang="en-US" sz="1600" kern="1200" dirty="0" err="1">
-                  <a:latin typeface="Arial" panose="020B0604020202020204" pitchFamily="34" charset="0"/>
-                  <a:cs typeface="Arial" panose="020B0604020202020204" pitchFamily="34" charset="0"/>
-                </a:rPr>
-                <a:t>giao</a:t>
-              </a:r>
-              <a:r>
-                <a:rPr lang="en-US" sz="1600" kern="1200" dirty="0">
-                  <a:latin typeface="Arial" panose="020B0604020202020204" pitchFamily="34" charset="0"/>
-                  <a:cs typeface="Arial" panose="020B0604020202020204" pitchFamily="34" charset="0"/>
-                </a:rPr>
-                <a:t> </a:t>
-              </a:r>
-              <a:r>
-                <a:rPr lang="en-US" sz="1600" kern="1200" dirty="0" err="1">
-                  <a:latin typeface="Arial" panose="020B0604020202020204" pitchFamily="34" charset="0"/>
-                  <a:cs typeface="Arial" panose="020B0604020202020204" pitchFamily="34" charset="0"/>
-                </a:rPr>
-                <a:t>diện</a:t>
-              </a:r>
-              <a:r>
-                <a:rPr lang="en-US" sz="1600" kern="1200" dirty="0">
-                  <a:latin typeface="Arial" panose="020B0604020202020204" pitchFamily="34" charset="0"/>
-                  <a:cs typeface="Arial" panose="020B0604020202020204" pitchFamily="34" charset="0"/>
-                </a:rPr>
-                <a:t> </a:t>
-              </a:r>
-              <a:r>
-                <a:rPr lang="en-US" sz="1600" kern="1200" dirty="0" err="1">
-                  <a:latin typeface="Arial" panose="020B0604020202020204" pitchFamily="34" charset="0"/>
-                  <a:cs typeface="Arial" panose="020B0604020202020204" pitchFamily="34" charset="0"/>
-                </a:rPr>
-                <a:t>trang</a:t>
-              </a:r>
-              <a:r>
-                <a:rPr lang="en-US" sz="1600" kern="1200" dirty="0">
-                  <a:latin typeface="Arial" panose="020B0604020202020204" pitchFamily="34" charset="0"/>
-                  <a:cs typeface="Arial" panose="020B0604020202020204" pitchFamily="34" charset="0"/>
-                </a:rPr>
-                <a:t> website </a:t>
-              </a:r>
-              <a:r>
-                <a:rPr lang="en-US" sz="1600" kern="1200" dirty="0" err="1">
-                  <a:latin typeface="Arial" panose="020B0604020202020204" pitchFamily="34" charset="0"/>
-                  <a:cs typeface="Arial" panose="020B0604020202020204" pitchFamily="34" charset="0"/>
-                </a:rPr>
-                <a:t>chuẩn</a:t>
-              </a:r>
-              <a:r>
-                <a:rPr lang="en-US" sz="1600" kern="1200" dirty="0">
-                  <a:latin typeface="Arial" panose="020B0604020202020204" pitchFamily="34" charset="0"/>
-                  <a:cs typeface="Arial" panose="020B0604020202020204" pitchFamily="34" charset="0"/>
-                </a:rPr>
-                <a:t>.</a:t>
-              </a:r>
-              <a:endParaRPr lang="en-US" sz="1600" kern="1200" dirty="0"/>
-            </a:p>
-          </p:txBody>
-        </p:sp>
-        <p:sp>
-          <p:nvSpPr>
-            <p:cNvPr id="9" name="Freeform: Shape 8"/>
-            <p:cNvSpPr/>
-            <p:nvPr/>
-          </p:nvSpPr>
-          <p:spPr>
-            <a:xfrm>
-              <a:off x="3399119" y="3999452"/>
-              <a:ext cx="2404441" cy="1366520"/>
-            </a:xfrm>
-            <a:custGeom>
-              <a:avLst/>
-              <a:gdLst>
-                <a:gd name="connsiteX0" fmla="*/ 0 w 2404441"/>
-                <a:gd name="connsiteY0" fmla="*/ 227758 h 1366520"/>
-                <a:gd name="connsiteX1" fmla="*/ 227758 w 2404441"/>
-                <a:gd name="connsiteY1" fmla="*/ 0 h 1366520"/>
-                <a:gd name="connsiteX2" fmla="*/ 2176683 w 2404441"/>
-                <a:gd name="connsiteY2" fmla="*/ 0 h 1366520"/>
-                <a:gd name="connsiteX3" fmla="*/ 2404441 w 2404441"/>
-                <a:gd name="connsiteY3" fmla="*/ 227758 h 1366520"/>
-                <a:gd name="connsiteX4" fmla="*/ 2404441 w 2404441"/>
-                <a:gd name="connsiteY4" fmla="*/ 1138762 h 1366520"/>
-                <a:gd name="connsiteX5" fmla="*/ 2176683 w 2404441"/>
-                <a:gd name="connsiteY5" fmla="*/ 1366520 h 1366520"/>
-                <a:gd name="connsiteX6" fmla="*/ 227758 w 2404441"/>
-                <a:gd name="connsiteY6" fmla="*/ 1366520 h 1366520"/>
-                <a:gd name="connsiteX7" fmla="*/ 0 w 2404441"/>
-                <a:gd name="connsiteY7" fmla="*/ 1138762 h 1366520"/>
-                <a:gd name="connsiteX8" fmla="*/ 0 w 2404441"/>
-                <a:gd name="connsiteY8" fmla="*/ 227758 h 1366520"/>
-              </a:gdLst>
-              <a:ahLst/>
-              <a:cxnLst>
-                <a:cxn ang="0">
-                  <a:pos x="connsiteX0" y="connsiteY0"/>
-                </a:cxn>
-                <a:cxn ang="0">
-                  <a:pos x="connsiteX1" y="connsiteY1"/>
-                </a:cxn>
-                <a:cxn ang="0">
-                  <a:pos x="connsiteX2" y="connsiteY2"/>
-                </a:cxn>
-                <a:cxn ang="0">
-                  <a:pos x="connsiteX3" y="connsiteY3"/>
-                </a:cxn>
-                <a:cxn ang="0">
-                  <a:pos x="connsiteX4" y="connsiteY4"/>
-                </a:cxn>
-                <a:cxn ang="0">
-                  <a:pos x="connsiteX5" y="connsiteY5"/>
-                </a:cxn>
-                <a:cxn ang="0">
-                  <a:pos x="connsiteX6" y="connsiteY6"/>
-                </a:cxn>
-                <a:cxn ang="0">
-                  <a:pos x="connsiteX7" y="connsiteY7"/>
-                </a:cxn>
-                <a:cxn ang="0">
-                  <a:pos x="connsiteX8" y="connsiteY8"/>
-                </a:cxn>
-              </a:cxnLst>
-              <a:rect l="l" t="t" r="r" b="b"/>
-              <a:pathLst>
-                <a:path w="2404441" h="1366520">
-                  <a:moveTo>
-                    <a:pt x="0" y="227758"/>
-                  </a:moveTo>
-                  <a:cubicBezTo>
-                    <a:pt x="0" y="101971"/>
-                    <a:pt x="101971" y="0"/>
-                    <a:pt x="227758" y="0"/>
-                  </a:cubicBezTo>
-                  <a:lnTo>
-                    <a:pt x="2176683" y="0"/>
-                  </a:lnTo>
-                  <a:cubicBezTo>
-                    <a:pt x="2302470" y="0"/>
-                    <a:pt x="2404441" y="101971"/>
-                    <a:pt x="2404441" y="227758"/>
-                  </a:cubicBezTo>
-                  <a:lnTo>
-                    <a:pt x="2404441" y="1138762"/>
-                  </a:lnTo>
-                  <a:cubicBezTo>
-                    <a:pt x="2404441" y="1264549"/>
-                    <a:pt x="2302470" y="1366520"/>
-                    <a:pt x="2176683" y="1366520"/>
-                  </a:cubicBezTo>
-                  <a:lnTo>
-                    <a:pt x="227758" y="1366520"/>
-                  </a:lnTo>
-                  <a:cubicBezTo>
-                    <a:pt x="101971" y="1366520"/>
-                    <a:pt x="0" y="1264549"/>
-                    <a:pt x="0" y="1138762"/>
-                  </a:cubicBezTo>
-                  <a:lnTo>
-                    <a:pt x="0" y="227758"/>
-                  </a:lnTo>
-                  <a:close/>
-                </a:path>
-              </a:pathLst>
-            </a:custGeom>
-          </p:spPr>
-          <p:style>
-            <a:lnRef idx="2">
-              <a:schemeClr val="lt1">
-                <a:hueOff val="0"/>
-                <a:satOff val="0"/>
-                <a:lumOff val="0"/>
-                <a:alphaOff val="0"/>
-              </a:schemeClr>
-            </a:lnRef>
-            <a:fillRef idx="1">
-              <a:schemeClr val="accent1">
-                <a:hueOff val="0"/>
-                <a:satOff val="0"/>
-                <a:lumOff val="0"/>
-                <a:alphaOff val="0"/>
-              </a:schemeClr>
-            </a:fillRef>
-            <a:effectRef idx="0">
-              <a:schemeClr val="accent1">
-                <a:hueOff val="0"/>
-                <a:satOff val="0"/>
-                <a:lumOff val="0"/>
-                <a:alphaOff val="0"/>
-              </a:schemeClr>
-            </a:effectRef>
-            <a:fontRef idx="minor">
-              <a:schemeClr val="lt1"/>
-            </a:fontRef>
-          </p:style>
-          <p:txBody>
-            <a:bodyPr spcFirstLastPara="0" vert="horz" wrap="square" lIns="127668" tIns="127668" rIns="127668" bIns="127668" numCol="1" spcCol="1270" anchor="ctr" anchorCtr="0">
-              <a:noAutofit/>
-            </a:bodyPr>
-            <a:lstStyle/>
-            <a:p>
-              <a:pPr marL="0" lvl="0" indent="0" algn="ctr" defTabSz="711200">
-                <a:lnSpc>
-                  <a:spcPct val="90000"/>
-                </a:lnSpc>
-                <a:spcBef>
-                  <a:spcPct val="0"/>
-                </a:spcBef>
-                <a:spcAft>
-                  <a:spcPct val="35000"/>
-                </a:spcAft>
-                <a:buNone/>
-              </a:pPr>
-              <a:r>
-                <a:rPr lang="en-US" sz="1600" kern="1200" dirty="0" err="1">
-                  <a:latin typeface="Arial" panose="020B0604020202020204" pitchFamily="34" charset="0"/>
-                  <a:cs typeface="Arial" panose="020B0604020202020204" pitchFamily="34" charset="0"/>
-                </a:rPr>
-                <a:t>Màu</a:t>
-              </a:r>
-              <a:r>
-                <a:rPr lang="en-US" sz="1600" kern="1200" dirty="0">
-                  <a:latin typeface="Arial" panose="020B0604020202020204" pitchFamily="34" charset="0"/>
-                  <a:cs typeface="Arial" panose="020B0604020202020204" pitchFamily="34" charset="0"/>
-                </a:rPr>
-                <a:t> nền trắng chủ đạo đơn giản, </a:t>
-              </a:r>
-              <a:r>
-                <a:rPr lang="en-US" sz="1600" kern="1200" dirty="0" err="1">
-                  <a:latin typeface="Arial" panose="020B0604020202020204" pitchFamily="34" charset="0"/>
-                  <a:cs typeface="Arial" panose="020B0604020202020204" pitchFamily="34" charset="0"/>
-                </a:rPr>
-                <a:t>làm</a:t>
-              </a:r>
-              <a:r>
-                <a:rPr lang="en-US" sz="1600" kern="1200" dirty="0">
-                  <a:latin typeface="Arial" panose="020B0604020202020204" pitchFamily="34" charset="0"/>
-                  <a:cs typeface="Arial" panose="020B0604020202020204" pitchFamily="34" charset="0"/>
-                </a:rPr>
-                <a:t> </a:t>
-              </a:r>
-              <a:r>
-                <a:rPr lang="en-US" sz="1600" kern="1200" dirty="0" err="1">
-                  <a:latin typeface="Arial" panose="020B0604020202020204" pitchFamily="34" charset="0"/>
-                  <a:cs typeface="Arial" panose="020B0604020202020204" pitchFamily="34" charset="0"/>
-                </a:rPr>
-                <a:t>nổi</a:t>
-              </a:r>
-              <a:r>
-                <a:rPr lang="en-US" sz="1600" kern="1200" dirty="0">
-                  <a:latin typeface="Arial" panose="020B0604020202020204" pitchFamily="34" charset="0"/>
-                  <a:cs typeface="Arial" panose="020B0604020202020204" pitchFamily="34" charset="0"/>
-                </a:rPr>
-                <a:t> </a:t>
-              </a:r>
-              <a:r>
-                <a:rPr lang="en-US" sz="1600" kern="1200" dirty="0" err="1">
-                  <a:latin typeface="Arial" panose="020B0604020202020204" pitchFamily="34" charset="0"/>
-                  <a:cs typeface="Arial" panose="020B0604020202020204" pitchFamily="34" charset="0"/>
-                </a:rPr>
-                <a:t>bật</a:t>
-              </a:r>
-              <a:r>
-                <a:rPr lang="en-US" sz="1600" kern="1200" dirty="0">
-                  <a:latin typeface="Arial" panose="020B0604020202020204" pitchFamily="34" charset="0"/>
-                  <a:cs typeface="Arial" panose="020B0604020202020204" pitchFamily="34" charset="0"/>
-                </a:rPr>
-                <a:t> </a:t>
-              </a:r>
-              <a:r>
-                <a:rPr lang="en-US" sz="1600" kern="1200" dirty="0" err="1">
-                  <a:latin typeface="Arial" panose="020B0604020202020204" pitchFamily="34" charset="0"/>
-                  <a:cs typeface="Arial" panose="020B0604020202020204" pitchFamily="34" charset="0"/>
-                </a:rPr>
-                <a:t>sản</a:t>
-              </a:r>
-              <a:r>
-                <a:rPr lang="en-US" sz="1600" kern="1200" dirty="0">
-                  <a:latin typeface="Arial" panose="020B0604020202020204" pitchFamily="34" charset="0"/>
-                  <a:cs typeface="Arial" panose="020B0604020202020204" pitchFamily="34" charset="0"/>
-                </a:rPr>
-                <a:t> </a:t>
-              </a:r>
-              <a:r>
-                <a:rPr lang="en-US" sz="1600" kern="1200" dirty="0" err="1">
-                  <a:latin typeface="Arial" panose="020B0604020202020204" pitchFamily="34" charset="0"/>
-                  <a:cs typeface="Arial" panose="020B0604020202020204" pitchFamily="34" charset="0"/>
-                </a:rPr>
-                <a:t>phẩm</a:t>
-              </a:r>
-              <a:r>
-                <a:rPr lang="en-US" sz="1600" kern="1200" dirty="0">
-                  <a:latin typeface="Arial" panose="020B0604020202020204" pitchFamily="34" charset="0"/>
-                  <a:cs typeface="Arial" panose="020B0604020202020204" pitchFamily="34" charset="0"/>
-                </a:rPr>
-                <a:t>.</a:t>
-              </a:r>
-              <a:endParaRPr lang="en-US" sz="1600" kern="1200" dirty="0"/>
-            </a:p>
-          </p:txBody>
-        </p:sp>
-        <p:sp>
-          <p:nvSpPr>
-            <p:cNvPr id="10" name="Freeform: Shape 9"/>
-            <p:cNvSpPr/>
-            <p:nvPr/>
-          </p:nvSpPr>
-          <p:spPr>
-            <a:xfrm>
-              <a:off x="5940728" y="3999452"/>
-              <a:ext cx="2404441" cy="1366520"/>
-            </a:xfrm>
-            <a:custGeom>
-              <a:avLst/>
-              <a:gdLst>
-                <a:gd name="connsiteX0" fmla="*/ 0 w 2404441"/>
-                <a:gd name="connsiteY0" fmla="*/ 227758 h 1366520"/>
-                <a:gd name="connsiteX1" fmla="*/ 227758 w 2404441"/>
-                <a:gd name="connsiteY1" fmla="*/ 0 h 1366520"/>
-                <a:gd name="connsiteX2" fmla="*/ 2176683 w 2404441"/>
-                <a:gd name="connsiteY2" fmla="*/ 0 h 1366520"/>
-                <a:gd name="connsiteX3" fmla="*/ 2404441 w 2404441"/>
-                <a:gd name="connsiteY3" fmla="*/ 227758 h 1366520"/>
-                <a:gd name="connsiteX4" fmla="*/ 2404441 w 2404441"/>
-                <a:gd name="connsiteY4" fmla="*/ 1138762 h 1366520"/>
-                <a:gd name="connsiteX5" fmla="*/ 2176683 w 2404441"/>
-                <a:gd name="connsiteY5" fmla="*/ 1366520 h 1366520"/>
-                <a:gd name="connsiteX6" fmla="*/ 227758 w 2404441"/>
-                <a:gd name="connsiteY6" fmla="*/ 1366520 h 1366520"/>
-                <a:gd name="connsiteX7" fmla="*/ 0 w 2404441"/>
-                <a:gd name="connsiteY7" fmla="*/ 1138762 h 1366520"/>
-                <a:gd name="connsiteX8" fmla="*/ 0 w 2404441"/>
-                <a:gd name="connsiteY8" fmla="*/ 227758 h 1366520"/>
-              </a:gdLst>
-              <a:ahLst/>
-              <a:cxnLst>
-                <a:cxn ang="0">
-                  <a:pos x="connsiteX0" y="connsiteY0"/>
-                </a:cxn>
-                <a:cxn ang="0">
-                  <a:pos x="connsiteX1" y="connsiteY1"/>
-                </a:cxn>
-                <a:cxn ang="0">
-                  <a:pos x="connsiteX2" y="connsiteY2"/>
-                </a:cxn>
-                <a:cxn ang="0">
-                  <a:pos x="connsiteX3" y="connsiteY3"/>
-                </a:cxn>
-                <a:cxn ang="0">
-                  <a:pos x="connsiteX4" y="connsiteY4"/>
-                </a:cxn>
-                <a:cxn ang="0">
-                  <a:pos x="connsiteX5" y="connsiteY5"/>
-                </a:cxn>
-                <a:cxn ang="0">
-                  <a:pos x="connsiteX6" y="connsiteY6"/>
-                </a:cxn>
-                <a:cxn ang="0">
-                  <a:pos x="connsiteX7" y="connsiteY7"/>
-                </a:cxn>
-                <a:cxn ang="0">
-                  <a:pos x="connsiteX8" y="connsiteY8"/>
-                </a:cxn>
-              </a:cxnLst>
-              <a:rect l="l" t="t" r="r" b="b"/>
-              <a:pathLst>
-                <a:path w="2404441" h="1366520">
-                  <a:moveTo>
-                    <a:pt x="0" y="227758"/>
-                  </a:moveTo>
-                  <a:cubicBezTo>
-                    <a:pt x="0" y="101971"/>
-                    <a:pt x="101971" y="0"/>
-                    <a:pt x="227758" y="0"/>
-                  </a:cubicBezTo>
-                  <a:lnTo>
-                    <a:pt x="2176683" y="0"/>
-                  </a:lnTo>
-                  <a:cubicBezTo>
-                    <a:pt x="2302470" y="0"/>
-                    <a:pt x="2404441" y="101971"/>
-                    <a:pt x="2404441" y="227758"/>
-                  </a:cubicBezTo>
-                  <a:lnTo>
-                    <a:pt x="2404441" y="1138762"/>
-                  </a:lnTo>
-                  <a:cubicBezTo>
-                    <a:pt x="2404441" y="1264549"/>
-                    <a:pt x="2302470" y="1366520"/>
-                    <a:pt x="2176683" y="1366520"/>
-                  </a:cubicBezTo>
-                  <a:lnTo>
-                    <a:pt x="227758" y="1366520"/>
-                  </a:lnTo>
-                  <a:cubicBezTo>
-                    <a:pt x="101971" y="1366520"/>
-                    <a:pt x="0" y="1264549"/>
-                    <a:pt x="0" y="1138762"/>
-                  </a:cubicBezTo>
-                  <a:lnTo>
-                    <a:pt x="0" y="227758"/>
-                  </a:lnTo>
-                  <a:close/>
-                </a:path>
-              </a:pathLst>
-            </a:custGeom>
-          </p:spPr>
-          <p:style>
-            <a:lnRef idx="2">
-              <a:schemeClr val="lt1">
-                <a:hueOff val="0"/>
-                <a:satOff val="0"/>
-                <a:lumOff val="0"/>
-                <a:alphaOff val="0"/>
-              </a:schemeClr>
-            </a:lnRef>
-            <a:fillRef idx="1">
-              <a:schemeClr val="accent1">
-                <a:hueOff val="0"/>
-                <a:satOff val="0"/>
-                <a:lumOff val="0"/>
-                <a:alphaOff val="0"/>
-              </a:schemeClr>
-            </a:fillRef>
-            <a:effectRef idx="0">
-              <a:schemeClr val="accent1">
-                <a:hueOff val="0"/>
-                <a:satOff val="0"/>
-                <a:lumOff val="0"/>
-                <a:alphaOff val="0"/>
-              </a:schemeClr>
-            </a:effectRef>
-            <a:fontRef idx="minor">
-              <a:schemeClr val="lt1"/>
-            </a:fontRef>
-          </p:style>
-          <p:txBody>
-            <a:bodyPr spcFirstLastPara="0" vert="horz" wrap="square" lIns="127668" tIns="127668" rIns="127668" bIns="127668" numCol="1" spcCol="1270" anchor="ctr" anchorCtr="0">
-              <a:noAutofit/>
-            </a:bodyPr>
-            <a:lstStyle/>
-            <a:p>
-              <a:pPr marL="0" lvl="0" indent="0" algn="ctr" defTabSz="711200">
-                <a:lnSpc>
-                  <a:spcPct val="90000"/>
-                </a:lnSpc>
-                <a:spcBef>
-                  <a:spcPct val="0"/>
-                </a:spcBef>
-                <a:spcAft>
-                  <a:spcPct val="35000"/>
-                </a:spcAft>
-                <a:buNone/>
-              </a:pPr>
-              <a:r>
-                <a:rPr lang="en-US" sz="1600" kern="1200" dirty="0" err="1">
-                  <a:latin typeface="Arial" panose="020B0604020202020204" pitchFamily="34" charset="0"/>
-                  <a:cs typeface="Arial" panose="020B0604020202020204" pitchFamily="34" charset="0"/>
-                </a:rPr>
-                <a:t>Hệ</a:t>
-              </a:r>
-              <a:r>
-                <a:rPr lang="en-US" sz="1600" kern="1200" dirty="0">
-                  <a:latin typeface="Arial" panose="020B0604020202020204" pitchFamily="34" charset="0"/>
-                  <a:cs typeface="Arial" panose="020B0604020202020204" pitchFamily="34" charset="0"/>
-                </a:rPr>
-                <a:t> </a:t>
-              </a:r>
-              <a:r>
-                <a:rPr lang="en-US" sz="1600" kern="1200" dirty="0" err="1">
-                  <a:latin typeface="Arial" panose="020B0604020202020204" pitchFamily="34" charset="0"/>
-                  <a:cs typeface="Arial" panose="020B0604020202020204" pitchFamily="34" charset="0"/>
-                </a:rPr>
-                <a:t>thống</a:t>
-              </a:r>
-              <a:r>
-                <a:rPr lang="en-US" sz="1600" kern="1200" dirty="0">
-                  <a:latin typeface="Arial" panose="020B0604020202020204" pitchFamily="34" charset="0"/>
-                  <a:cs typeface="Arial" panose="020B0604020202020204" pitchFamily="34" charset="0"/>
-                </a:rPr>
-                <a:t> website đ</a:t>
-              </a:r>
-              <a:r>
-                <a:rPr lang="vi-VN" sz="1600" kern="1200" dirty="0">
-                  <a:latin typeface="Arial" panose="020B0604020202020204" pitchFamily="34" charset="0"/>
-                  <a:cs typeface="Arial" panose="020B0604020202020204" pitchFamily="34" charset="0"/>
-                </a:rPr>
-                <a:t>ư</a:t>
-              </a:r>
-              <a:r>
-                <a:rPr lang="en-US" sz="1600" kern="1200" dirty="0" err="1">
-                  <a:latin typeface="Arial" panose="020B0604020202020204" pitchFamily="34" charset="0"/>
-                  <a:cs typeface="Arial" panose="020B0604020202020204" pitchFamily="34" charset="0"/>
-                </a:rPr>
-                <a:t>ợc</a:t>
-              </a:r>
-              <a:r>
-                <a:rPr lang="en-US" sz="1600" kern="1200" dirty="0">
-                  <a:latin typeface="Arial" panose="020B0604020202020204" pitchFamily="34" charset="0"/>
-                  <a:cs typeface="Arial" panose="020B0604020202020204" pitchFamily="34" charset="0"/>
-                </a:rPr>
-                <a:t> </a:t>
-              </a:r>
-              <a:r>
-                <a:rPr lang="en-US" sz="1600" kern="1200" dirty="0" err="1">
-                  <a:latin typeface="Arial" panose="020B0604020202020204" pitchFamily="34" charset="0"/>
-                  <a:cs typeface="Arial" panose="020B0604020202020204" pitchFamily="34" charset="0"/>
-                </a:rPr>
-                <a:t>phân</a:t>
-              </a:r>
-              <a:r>
-                <a:rPr lang="en-US" sz="1600" kern="1200" dirty="0">
-                  <a:latin typeface="Arial" panose="020B0604020202020204" pitchFamily="34" charset="0"/>
-                  <a:cs typeface="Arial" panose="020B0604020202020204" pitchFamily="34" charset="0"/>
-                </a:rPr>
-                <a:t> chia </a:t>
-              </a:r>
-              <a:r>
-                <a:rPr lang="en-US" sz="1600" kern="1200" dirty="0" err="1">
-                  <a:latin typeface="Arial" panose="020B0604020202020204" pitchFamily="34" charset="0"/>
-                  <a:cs typeface="Arial" panose="020B0604020202020204" pitchFamily="34" charset="0"/>
-                </a:rPr>
-                <a:t>rõ</a:t>
-              </a:r>
-              <a:r>
-                <a:rPr lang="en-US" sz="1600" kern="1200" dirty="0">
-                  <a:latin typeface="Arial" panose="020B0604020202020204" pitchFamily="34" charset="0"/>
-                  <a:cs typeface="Arial" panose="020B0604020202020204" pitchFamily="34" charset="0"/>
-                </a:rPr>
-                <a:t> </a:t>
-              </a:r>
-              <a:r>
-                <a:rPr lang="en-US" sz="1600" kern="1200" dirty="0" err="1">
-                  <a:latin typeface="Arial" panose="020B0604020202020204" pitchFamily="34" charset="0"/>
-                  <a:cs typeface="Arial" panose="020B0604020202020204" pitchFamily="34" charset="0"/>
-                </a:rPr>
-                <a:t>ràng</a:t>
-              </a:r>
-              <a:r>
-                <a:rPr lang="en-US" sz="1600" kern="1200" dirty="0">
-                  <a:latin typeface="Arial" panose="020B0604020202020204" pitchFamily="34" charset="0"/>
-                  <a:cs typeface="Arial" panose="020B0604020202020204" pitchFamily="34" charset="0"/>
-                </a:rPr>
-                <a:t>. </a:t>
-              </a:r>
-              <a:r>
-                <a:rPr lang="en-US" sz="1600" kern="1200" dirty="0" err="1">
-                  <a:latin typeface="Arial" panose="020B0604020202020204" pitchFamily="34" charset="0"/>
-                  <a:cs typeface="Arial" panose="020B0604020202020204" pitchFamily="34" charset="0"/>
-                </a:rPr>
-                <a:t>Giúp</a:t>
-              </a:r>
-              <a:r>
-                <a:rPr lang="en-US" sz="1600" kern="1200" dirty="0">
-                  <a:latin typeface="Arial" panose="020B0604020202020204" pitchFamily="34" charset="0"/>
-                  <a:cs typeface="Arial" panose="020B0604020202020204" pitchFamily="34" charset="0"/>
-                </a:rPr>
-                <a:t> ng</a:t>
-              </a:r>
-              <a:r>
-                <a:rPr lang="vi-VN" sz="1600" kern="1200" dirty="0">
-                  <a:latin typeface="Arial" panose="020B0604020202020204" pitchFamily="34" charset="0"/>
-                  <a:cs typeface="Arial" panose="020B0604020202020204" pitchFamily="34" charset="0"/>
-                </a:rPr>
-                <a:t>ư</a:t>
-              </a:r>
-              <a:r>
-                <a:rPr lang="en-US" sz="1600" kern="1200" dirty="0" err="1">
-                  <a:latin typeface="Arial" panose="020B0604020202020204" pitchFamily="34" charset="0"/>
-                  <a:cs typeface="Arial" panose="020B0604020202020204" pitchFamily="34" charset="0"/>
-                </a:rPr>
-                <a:t>ời</a:t>
-              </a:r>
-              <a:r>
-                <a:rPr lang="en-US" sz="1600" kern="1200" dirty="0">
-                  <a:latin typeface="Arial" panose="020B0604020202020204" pitchFamily="34" charset="0"/>
-                  <a:cs typeface="Arial" panose="020B0604020202020204" pitchFamily="34" charset="0"/>
-                </a:rPr>
-                <a:t> </a:t>
-              </a:r>
-              <a:r>
-                <a:rPr lang="en-US" sz="1600" kern="1200" dirty="0" err="1">
-                  <a:latin typeface="Arial" panose="020B0604020202020204" pitchFamily="34" charset="0"/>
-                  <a:cs typeface="Arial" panose="020B0604020202020204" pitchFamily="34" charset="0"/>
-                </a:rPr>
-                <a:t>dùng</a:t>
-              </a:r>
-              <a:r>
-                <a:rPr lang="en-US" sz="1600" kern="1200" dirty="0">
-                  <a:latin typeface="Arial" panose="020B0604020202020204" pitchFamily="34" charset="0"/>
-                  <a:cs typeface="Arial" panose="020B0604020202020204" pitchFamily="34" charset="0"/>
-                </a:rPr>
-                <a:t> </a:t>
-              </a:r>
-              <a:r>
-                <a:rPr lang="en-US" sz="1600" kern="1200" dirty="0" err="1">
-                  <a:latin typeface="Arial" panose="020B0604020202020204" pitchFamily="34" charset="0"/>
-                  <a:cs typeface="Arial" panose="020B0604020202020204" pitchFamily="34" charset="0"/>
-                </a:rPr>
-                <a:t>dễ</a:t>
-              </a:r>
-              <a:r>
-                <a:rPr lang="en-US" sz="1600" kern="1200" dirty="0">
-                  <a:latin typeface="Arial" panose="020B0604020202020204" pitchFamily="34" charset="0"/>
-                  <a:cs typeface="Arial" panose="020B0604020202020204" pitchFamily="34" charset="0"/>
-                </a:rPr>
-                <a:t> </a:t>
-              </a:r>
-              <a:r>
-                <a:rPr lang="en-US" sz="1600" kern="1200" dirty="0" err="1">
-                  <a:latin typeface="Arial" panose="020B0604020202020204" pitchFamily="34" charset="0"/>
-                  <a:cs typeface="Arial" panose="020B0604020202020204" pitchFamily="34" charset="0"/>
-                </a:rPr>
-                <a:t>dàng</a:t>
-              </a:r>
-              <a:r>
-                <a:rPr lang="en-US" sz="1600" kern="1200" dirty="0">
-                  <a:latin typeface="Arial" panose="020B0604020202020204" pitchFamily="34" charset="0"/>
-                  <a:cs typeface="Arial" panose="020B0604020202020204" pitchFamily="34" charset="0"/>
-                </a:rPr>
-                <a:t> </a:t>
-              </a:r>
-              <a:r>
-                <a:rPr lang="en-US" sz="1600" kern="1200" dirty="0" err="1">
-                  <a:latin typeface="Arial" panose="020B0604020202020204" pitchFamily="34" charset="0"/>
-                  <a:cs typeface="Arial" panose="020B0604020202020204" pitchFamily="34" charset="0"/>
-                </a:rPr>
-                <a:t>mua</a:t>
-              </a:r>
-              <a:r>
-                <a:rPr lang="en-US" sz="1600" kern="1200" dirty="0">
-                  <a:latin typeface="Arial" panose="020B0604020202020204" pitchFamily="34" charset="0"/>
-                  <a:cs typeface="Arial" panose="020B0604020202020204" pitchFamily="34" charset="0"/>
-                </a:rPr>
-                <a:t> </a:t>
-              </a:r>
-              <a:r>
-                <a:rPr lang="en-US" sz="1600" kern="1200" dirty="0" err="1">
-                  <a:latin typeface="Arial" panose="020B0604020202020204" pitchFamily="34" charset="0"/>
-                  <a:cs typeface="Arial" panose="020B0604020202020204" pitchFamily="34" charset="0"/>
-                </a:rPr>
-                <a:t>sắm</a:t>
-              </a:r>
-              <a:r>
-                <a:rPr lang="en-US" sz="1600" kern="1200" dirty="0">
-                  <a:latin typeface="Arial" panose="020B0604020202020204" pitchFamily="34" charset="0"/>
-                  <a:cs typeface="Arial" panose="020B0604020202020204" pitchFamily="34" charset="0"/>
-                </a:rPr>
-                <a:t>, admin </a:t>
-              </a:r>
-              <a:r>
-                <a:rPr lang="en-US" sz="1600" kern="1200" dirty="0" err="1">
-                  <a:latin typeface="Arial" panose="020B0604020202020204" pitchFamily="34" charset="0"/>
-                  <a:cs typeface="Arial" panose="020B0604020202020204" pitchFamily="34" charset="0"/>
-                </a:rPr>
-                <a:t>dễ</a:t>
-              </a:r>
-              <a:r>
-                <a:rPr lang="en-US" sz="1600" kern="1200" dirty="0">
-                  <a:latin typeface="Arial" panose="020B0604020202020204" pitchFamily="34" charset="0"/>
-                  <a:cs typeface="Arial" panose="020B0604020202020204" pitchFamily="34" charset="0"/>
-                </a:rPr>
-                <a:t> </a:t>
-              </a:r>
-              <a:r>
-                <a:rPr lang="en-US" sz="1600" kern="1200" dirty="0" err="1">
-                  <a:latin typeface="Arial" panose="020B0604020202020204" pitchFamily="34" charset="0"/>
-                  <a:cs typeface="Arial" panose="020B0604020202020204" pitchFamily="34" charset="0"/>
-                </a:rPr>
-                <a:t>dàng</a:t>
-              </a:r>
-              <a:r>
-                <a:rPr lang="en-US" sz="1600" kern="1200" dirty="0">
-                  <a:latin typeface="Arial" panose="020B0604020202020204" pitchFamily="34" charset="0"/>
-                  <a:cs typeface="Arial" panose="020B0604020202020204" pitchFamily="34" charset="0"/>
-                </a:rPr>
-                <a:t> </a:t>
-              </a:r>
-              <a:r>
-                <a:rPr lang="en-US" sz="1600" kern="1200" dirty="0" err="1">
-                  <a:latin typeface="Arial" panose="020B0604020202020204" pitchFamily="34" charset="0"/>
-                  <a:cs typeface="Arial" panose="020B0604020202020204" pitchFamily="34" charset="0"/>
-                </a:rPr>
-                <a:t>quản</a:t>
-              </a:r>
-              <a:r>
-                <a:rPr lang="en-US" sz="1600" kern="1200" dirty="0">
-                  <a:latin typeface="Arial" panose="020B0604020202020204" pitchFamily="34" charset="0"/>
-                  <a:cs typeface="Arial" panose="020B0604020202020204" pitchFamily="34" charset="0"/>
-                </a:rPr>
-                <a:t> </a:t>
-              </a:r>
-              <a:r>
-                <a:rPr lang="en-US" sz="1600" kern="1200" dirty="0" err="1">
-                  <a:latin typeface="Arial" panose="020B0604020202020204" pitchFamily="34" charset="0"/>
-                  <a:cs typeface="Arial" panose="020B0604020202020204" pitchFamily="34" charset="0"/>
-                </a:rPr>
-                <a:t>lý</a:t>
-              </a:r>
-              <a:r>
-                <a:rPr lang="en-US" sz="1600" kern="1200" dirty="0">
-                  <a:latin typeface="Arial" panose="020B0604020202020204" pitchFamily="34" charset="0"/>
-                  <a:cs typeface="Arial" panose="020B0604020202020204" pitchFamily="34" charset="0"/>
-                </a:rPr>
-                <a:t>.</a:t>
-              </a:r>
-              <a:endParaRPr lang="en-US" sz="1600" kern="1200" dirty="0"/>
-            </a:p>
-          </p:txBody>
-        </p:sp>
-      </p:grpSp>
-      <p:sp>
-        <p:nvSpPr>
-          <p:cNvPr id="8" name="Oval 7"/>
-          <p:cNvSpPr/>
-          <p:nvPr/>
-        </p:nvSpPr>
-        <p:spPr>
-          <a:xfrm>
-            <a:off x="9029263" y="3215227"/>
-            <a:ext cx="2491409" cy="1060173"/>
-          </a:xfrm>
-          <a:prstGeom prst="ellipse">
-            <a:avLst/>
-          </a:prstGeom>
-          <a:solidFill>
-            <a:schemeClr val="accent1">
-              <a:lumMod val="20000"/>
-              <a:lumOff val="80000"/>
-            </a:schemeClr>
-          </a:solidFill>
-        </p:spPr>
-        <p:style>
-          <a:lnRef idx="2">
-            <a:schemeClr val="accent1">
-              <a:shade val="50000"/>
-            </a:schemeClr>
-          </a:lnRef>
-          <a:fillRef idx="1">
-            <a:schemeClr val="accent1"/>
-          </a:fillRef>
-          <a:effectRef idx="0">
-            <a:schemeClr val="accent1"/>
-          </a:effectRef>
-          <a:fontRef idx="minor">
-            <a:schemeClr val="lt1"/>
-          </a:fontRef>
-        </p:style>
-        <p:txBody>
-          <a:bodyPr rtlCol="0" anchor="ctr"/>
-          <a:lstStyle/>
-          <a:p>
-            <a:pPr algn="ctr"/>
-            <a:r>
-              <a:rPr lang="en-US" b="1" dirty="0">
-                <a:solidFill>
-                  <a:srgbClr val="C00000"/>
-                </a:solidFill>
-                <a:effectLst>
-                  <a:outerShdw blurRad="38100" dist="38100" dir="2700000" algn="tl">
-                    <a:srgbClr val="000000">
-                      <a:alpha val="43137"/>
-                    </a:srgbClr>
-                  </a:outerShdw>
-                </a:effectLst>
-                <a:latin typeface="Arial" panose="020B0604020202020204" pitchFamily="34" charset="0"/>
-                <a:cs typeface="Arial" panose="020B0604020202020204" pitchFamily="34" charset="0"/>
-              </a:rPr>
-              <a:t>ƯU ĐIỂM</a:t>
-            </a:r>
-          </a:p>
-        </p:txBody>
-      </p:sp>
-      <p:sp>
-        <p:nvSpPr>
-          <p:cNvPr id="17" name="Text Box 16"/>
-          <p:cNvSpPr txBox="1"/>
-          <p:nvPr/>
-        </p:nvSpPr>
-        <p:spPr>
-          <a:xfrm>
-            <a:off x="879475" y="1130619"/>
-            <a:ext cx="9234751" cy="396240"/>
-          </a:xfrm>
-          <a:prstGeom prst="rect">
-            <a:avLst/>
-          </a:prstGeom>
-        </p:spPr>
-        <p:style>
-          <a:lnRef idx="1">
-            <a:schemeClr val="accent3"/>
-          </a:lnRef>
-          <a:fillRef idx="3">
-            <a:schemeClr val="accent3"/>
-          </a:fillRef>
-          <a:effectRef idx="2">
-            <a:schemeClr val="accent3"/>
-          </a:effectRef>
-          <a:fontRef idx="minor">
-            <a:schemeClr val="lt1"/>
-          </a:fontRef>
-        </p:style>
-        <p:txBody>
-          <a:bodyPr wrap="square">
-            <a:spAutoFit/>
-          </a:bodyPr>
-          <a:lstStyle/>
-          <a:p>
-            <a:pPr marL="0" indent="0"/>
-            <a:r>
-              <a:rPr lang="en-US" sz="2000" b="1">
-                <a:solidFill>
-                  <a:srgbClr val="000000"/>
-                </a:solidFill>
-                <a:latin typeface="Times New Roman" panose="02020603050405020304" charset="0"/>
-                <a:ea typeface="Times New Roman" panose="02020603050405020304" charset="0"/>
-                <a:cs typeface="Times New Roman" panose="02020603050405020304" charset="0"/>
-                <a:sym typeface="+mn-ea"/>
-              </a:rPr>
-              <a:t>1) Đánh giá</a:t>
-            </a:r>
-          </a:p>
-        </p:txBody>
-      </p:sp>
-    </p:spTree>
-  </p:cSld>
-  <p:clrMapOvr>
-    <a:masterClrMapping/>
-  </p:clrMapOvr>
-  <mc:AlternateContent xmlns:mc="http://schemas.openxmlformats.org/markup-compatibility/2006" xmlns:p14="http://schemas.microsoft.com/office/powerpoint/2010/main">
-    <mc:Choice Requires="p14">
-      <p:transition spd="slow" p14:dur="1400">
-        <p14:doors dir="vert"/>
-      </p:transition>
-    </mc:Choice>
-    <mc:Fallback xmlns="">
-      <p:transition spd="slow">
-        <p:fade/>
-      </p:transition>
-    </mc:Fallback>
-  </mc:AlternateContent>
-  <p:timing>
-    <p:tnLst>
-      <p:par>
-        <p:cTn id="1" dur="indefinite" restart="never" nodeType="tmRoot">
-          <p:childTnLst>
-            <p:seq concurrent="1" nextAc="seek">
-              <p:cTn id="2" dur="indefinite" nodeType="mainSeq">
-                <p:childTnLst>
-                  <p:par>
-                    <p:cTn id="3" fill="hold">
-                      <p:stCondLst>
-                        <p:cond delay="indefinite"/>
-                        <p:cond evt="onBegin" delay="0">
-                          <p:tn val="2"/>
-                        </p:cond>
-                      </p:stCondLst>
-                      <p:childTnLst>
-                        <p:par>
-                          <p:cTn id="4" fill="hold">
-                            <p:stCondLst>
-                              <p:cond delay="0"/>
-                            </p:stCondLst>
-                            <p:childTnLst>
-                              <p:par>
-                                <p:cTn id="5" presetID="32" presetClass="emph" presetSubtype="0" fill="hold" nodeType="withEffect">
-                                  <p:stCondLst>
-                                    <p:cond delay="0"/>
-                                  </p:stCondLst>
-                                  <p:childTnLst>
-                                    <p:animRot by="120000">
-                                      <p:cBhvr>
-                                        <p:cTn id="6" dur="100" fill="hold">
-                                          <p:stCondLst>
-                                            <p:cond delay="0"/>
-                                          </p:stCondLst>
-                                        </p:cTn>
-                                        <p:tgtEl>
-                                          <p:spTgt spid="2"/>
-                                        </p:tgtEl>
-                                        <p:attrNameLst>
-                                          <p:attrName>r</p:attrName>
-                                        </p:attrNameLst>
-                                      </p:cBhvr>
-                                    </p:animRot>
-                                    <p:animRot by="-240000">
-                                      <p:cBhvr>
-                                        <p:cTn id="7" dur="200" fill="hold">
-                                          <p:stCondLst>
-                                            <p:cond delay="200"/>
-                                          </p:stCondLst>
-                                        </p:cTn>
-                                        <p:tgtEl>
-                                          <p:spTgt spid="2"/>
-                                        </p:tgtEl>
-                                        <p:attrNameLst>
-                                          <p:attrName>r</p:attrName>
-                                        </p:attrNameLst>
-                                      </p:cBhvr>
-                                    </p:animRot>
-                                    <p:animRot by="240000">
-                                      <p:cBhvr>
-                                        <p:cTn id="8" dur="200" fill="hold">
-                                          <p:stCondLst>
-                                            <p:cond delay="400"/>
-                                          </p:stCondLst>
-                                        </p:cTn>
-                                        <p:tgtEl>
-                                          <p:spTgt spid="2"/>
-                                        </p:tgtEl>
-                                        <p:attrNameLst>
-                                          <p:attrName>r</p:attrName>
-                                        </p:attrNameLst>
-                                      </p:cBhvr>
-                                    </p:animRot>
-                                    <p:animRot by="-240000">
-                                      <p:cBhvr>
-                                        <p:cTn id="9" dur="200" fill="hold">
-                                          <p:stCondLst>
-                                            <p:cond delay="600"/>
-                                          </p:stCondLst>
-                                        </p:cTn>
-                                        <p:tgtEl>
-                                          <p:spTgt spid="2"/>
-                                        </p:tgtEl>
-                                        <p:attrNameLst>
-                                          <p:attrName>r</p:attrName>
-                                        </p:attrNameLst>
-                                      </p:cBhvr>
-                                    </p:animRot>
-                                    <p:animRot by="120000">
-                                      <p:cBhvr>
-                                        <p:cTn id="10" dur="200" fill="hold">
-                                          <p:stCondLst>
-                                            <p:cond delay="800"/>
-                                          </p:stCondLst>
-                                        </p:cTn>
-                                        <p:tgtEl>
-                                          <p:spTgt spid="2"/>
-                                        </p:tgtEl>
-                                        <p:attrNameLst>
-                                          <p:attrName>r</p:attrName>
-                                        </p:attrNameLst>
-                                      </p:cBhvr>
-                                    </p:animRot>
-                                  </p:childTnLst>
-                                </p:cTn>
-                              </p:par>
-                            </p:childTnLst>
-                          </p:cTn>
-                        </p:par>
-                      </p:childTnLst>
-                    </p:cTn>
-                  </p:par>
-                </p:childTnLst>
-              </p:cTn>
-              <p:prevCondLst>
-                <p:cond evt="onPrev" delay="0">
-                  <p:tgtEl>
-                    <p:sldTgt/>
-                  </p:tgtEl>
-                </p:cond>
-              </p:prevCondLst>
-              <p:nextCondLst>
-                <p:cond evt="onNext" delay="0">
-                  <p:tgtEl>
-                    <p:sldTgt/>
-                  </p:tgtEl>
-                </p:cond>
-              </p:nextCondLst>
-            </p:seq>
-          </p:childTnLst>
-        </p:cTn>
-      </p:par>
-    </p:tnLst>
-  </p:timing>
-</p:sld>
-</file>
-
-<file path=ppt/slides/slide3.xml><?xml version="1.0" encoding="utf-8"?>
-<p:sld xmlns:a="http://schemas.openxmlformats.org/drawingml/2006/main" xmlns:r="http://schemas.openxmlformats.org/officeDocument/2006/relationships" xmlns:p="http://schemas.openxmlformats.org/presentationml/2006/main">
-  <p:cSld>
-    <p:spTree>
-      <p:nvGrpSpPr>
-        <p:cNvPr id="1" name=""/>
-        <p:cNvGrpSpPr/>
-        <p:nvPr/>
-      </p:nvGrpSpPr>
-      <p:grpSpPr>
-        <a:xfrm>
-          <a:off x="0" y="0"/>
-          <a:ext cx="0" cy="0"/>
-          <a:chOff x="0" y="0"/>
-          <a:chExt cx="0" cy="0"/>
-        </a:xfrm>
-      </p:grpSpPr>
-      <p:sp>
-        <p:nvSpPr>
-          <p:cNvPr id="12" name="Title 1"/>
-          <p:cNvSpPr txBox="1"/>
-          <p:nvPr/>
-        </p:nvSpPr>
-        <p:spPr>
-          <a:xfrm>
-            <a:off x="1242168" y="194259"/>
-            <a:ext cx="8761413" cy="728480"/>
-          </a:xfrm>
-          <a:prstGeom prst="rect">
-            <a:avLst/>
-          </a:prstGeom>
-          <a:effectLst/>
-        </p:spPr>
-        <p:txBody>
-          <a:bodyPr vert="horz" lIns="91440" tIns="45720" rIns="91440" bIns="45720" rtlCol="0" anchor="ctr">
-            <a:normAutofit/>
-          </a:bodyPr>
-          <a:lstStyle>
-            <a:lvl1pPr algn="ctr" defTabSz="457200" rtl="0" eaLnBrk="1" latinLnBrk="0" hangingPunct="1">
-              <a:spcBef>
-                <a:spcPct val="0"/>
-              </a:spcBef>
-              <a:buNone/>
-              <a:defRPr sz="4000" kern="1200" cap="none">
-                <a:ln w="3175" cmpd="sng">
-                  <a:noFill/>
-                </a:ln>
-                <a:solidFill>
-                  <a:schemeClr val="tx1"/>
-                </a:solidFill>
-                <a:effectLst/>
-                <a:latin typeface="+mj-lt"/>
-                <a:ea typeface="+mj-ea"/>
-                <a:cs typeface="+mj-cs"/>
-              </a:defRPr>
-            </a:lvl1pPr>
-            <a:lvl2pPr eaLnBrk="1" hangingPunct="1">
-              <a:defRPr>
-                <a:solidFill>
-                  <a:schemeClr val="tx2"/>
-                </a:solidFill>
-              </a:defRPr>
-            </a:lvl2pPr>
-            <a:lvl3pPr eaLnBrk="1" hangingPunct="1">
-              <a:defRPr>
-                <a:solidFill>
-                  <a:schemeClr val="tx2"/>
-                </a:solidFill>
-              </a:defRPr>
-            </a:lvl3pPr>
-            <a:lvl4pPr eaLnBrk="1" hangingPunct="1">
-              <a:defRPr>
-                <a:solidFill>
-                  <a:schemeClr val="tx2"/>
-                </a:solidFill>
-              </a:defRPr>
-            </a:lvl4pPr>
-            <a:lvl5pPr eaLnBrk="1" hangingPunct="1">
-              <a:defRPr>
-                <a:solidFill>
-                  <a:schemeClr val="tx2"/>
-                </a:solidFill>
-              </a:defRPr>
-            </a:lvl5pPr>
-            <a:lvl6pPr eaLnBrk="1" hangingPunct="1">
-              <a:defRPr>
-                <a:solidFill>
-                  <a:schemeClr val="tx2"/>
-                </a:solidFill>
-              </a:defRPr>
-            </a:lvl6pPr>
-            <a:lvl7pPr eaLnBrk="1" hangingPunct="1">
-              <a:defRPr>
-                <a:solidFill>
-                  <a:schemeClr val="tx2"/>
-                </a:solidFill>
-              </a:defRPr>
-            </a:lvl7pPr>
-            <a:lvl8pPr eaLnBrk="1" hangingPunct="1">
-              <a:defRPr>
-                <a:solidFill>
-                  <a:schemeClr val="tx2"/>
-                </a:solidFill>
-              </a:defRPr>
-            </a:lvl8pPr>
-            <a:lvl9pPr eaLnBrk="1" hangingPunct="1">
-              <a:defRPr>
-                <a:solidFill>
-                  <a:schemeClr val="tx2"/>
-                </a:solidFill>
-              </a:defRPr>
-            </a:lvl9pPr>
-          </a:lstStyle>
-          <a:p>
-            <a:r>
-              <a:rPr lang="en-US" sz="2500" b="1" i="1" dirty="0">
-                <a:solidFill>
-                  <a:srgbClr val="FF0000"/>
-                </a:solidFill>
-                <a:effectLst/>
-                <a:latin typeface="Times New Roman" panose="02020603050405020304" charset="0"/>
-                <a:cs typeface="Times New Roman" panose="02020603050405020304" charset="0"/>
-              </a:rPr>
-              <a:t>CH</a:t>
-            </a:r>
-            <a:r>
-              <a:rPr lang="vi-VN" sz="2500" b="1" i="1" dirty="0">
-                <a:solidFill>
-                  <a:srgbClr val="FF0000"/>
-                </a:solidFill>
-                <a:effectLst/>
-                <a:latin typeface="Times New Roman" panose="02020603050405020304" charset="0"/>
-                <a:cs typeface="Times New Roman" panose="02020603050405020304" charset="0"/>
-              </a:rPr>
-              <a:t>Ư</a:t>
-            </a:r>
-            <a:r>
-              <a:rPr lang="en-US" sz="2500" b="1" i="1" dirty="0">
-                <a:solidFill>
-                  <a:srgbClr val="FF0000"/>
-                </a:solidFill>
-                <a:effectLst/>
-                <a:latin typeface="Times New Roman" panose="02020603050405020304" charset="0"/>
-                <a:cs typeface="Times New Roman" panose="02020603050405020304" charset="0"/>
-              </a:rPr>
-              <a:t>ƠNG 4 : ĐÁNH GIÁ VÀ KẾT LUẬN</a:t>
-            </a:r>
-          </a:p>
-        </p:txBody>
-      </p:sp>
-      <p:sp>
-        <p:nvSpPr>
-          <p:cNvPr id="17" name="Text Box 16"/>
-          <p:cNvSpPr txBox="1"/>
-          <p:nvPr/>
-        </p:nvSpPr>
-        <p:spPr>
-          <a:xfrm>
-            <a:off x="879475" y="1130619"/>
-            <a:ext cx="9234751" cy="396240"/>
-          </a:xfrm>
-          <a:prstGeom prst="rect">
-            <a:avLst/>
-          </a:prstGeom>
-        </p:spPr>
-        <p:style>
-          <a:lnRef idx="1">
-            <a:schemeClr val="accent3"/>
-          </a:lnRef>
-          <a:fillRef idx="3">
-            <a:schemeClr val="accent3"/>
-          </a:fillRef>
-          <a:effectRef idx="2">
-            <a:schemeClr val="accent3"/>
-          </a:effectRef>
-          <a:fontRef idx="minor">
-            <a:schemeClr val="lt1"/>
-          </a:fontRef>
-        </p:style>
-        <p:txBody>
-          <a:bodyPr wrap="square">
-            <a:spAutoFit/>
-          </a:bodyPr>
-          <a:lstStyle/>
-          <a:p>
-            <a:pPr marL="0" indent="0"/>
-            <a:r>
-              <a:rPr lang="en-US" sz="2000" b="1">
-                <a:solidFill>
-                  <a:srgbClr val="000000"/>
-                </a:solidFill>
-                <a:latin typeface="Times New Roman" panose="02020603050405020304" charset="0"/>
-                <a:ea typeface="Times New Roman" panose="02020603050405020304" charset="0"/>
-                <a:cs typeface="Times New Roman" panose="02020603050405020304" charset="0"/>
-                <a:sym typeface="+mn-ea"/>
-              </a:rPr>
-              <a:t>1) Đánh giá</a:t>
-            </a:r>
-          </a:p>
-        </p:txBody>
-      </p:sp>
-      <p:sp>
-        <p:nvSpPr>
-          <p:cNvPr id="4" name="Arrow: Pentagon 5"/>
-          <p:cNvSpPr/>
-          <p:nvPr/>
-        </p:nvSpPr>
-        <p:spPr>
-          <a:xfrm>
-            <a:off x="879609" y="2410108"/>
-            <a:ext cx="6115687" cy="1421227"/>
-          </a:xfrm>
-          <a:prstGeom prst="homePlate">
-            <a:avLst/>
-          </a:prstGeom>
-        </p:spPr>
-        <p:style>
-          <a:lnRef idx="2">
-            <a:schemeClr val="accent1">
-              <a:shade val="50000"/>
-            </a:schemeClr>
-          </a:lnRef>
-          <a:fillRef idx="1">
-            <a:schemeClr val="accent1"/>
-          </a:fillRef>
-          <a:effectRef idx="0">
-            <a:schemeClr val="accent1"/>
-          </a:effectRef>
-          <a:fontRef idx="minor">
-            <a:schemeClr val="lt1"/>
-          </a:fontRef>
-        </p:style>
-        <p:txBody>
-          <a:bodyPr rtlCol="0" anchor="ctr"/>
-          <a:lstStyle/>
-          <a:p>
-            <a:pPr algn="ctr"/>
-            <a:r>
-              <a:rPr lang="en-US" dirty="0">
-                <a:latin typeface="Arial" panose="020B0604020202020204" pitchFamily="34" charset="0"/>
-                <a:cs typeface="Arial" panose="020B0604020202020204" pitchFamily="34" charset="0"/>
-              </a:rPr>
-              <a:t>Ch</a:t>
-            </a:r>
-            <a:r>
-              <a:rPr lang="vi-VN" dirty="0">
-                <a:latin typeface="Arial" panose="020B0604020202020204" pitchFamily="34" charset="0"/>
-                <a:cs typeface="Arial" panose="020B0604020202020204" pitchFamily="34" charset="0"/>
-              </a:rPr>
-              <a:t>ư</a:t>
-            </a:r>
-            <a:r>
-              <a:rPr lang="en-US" dirty="0">
-                <a:latin typeface="Arial" panose="020B0604020202020204" pitchFamily="34" charset="0"/>
-                <a:cs typeface="Arial" panose="020B0604020202020204" pitchFamily="34" charset="0"/>
-              </a:rPr>
-              <a:t>a </a:t>
-            </a:r>
-            <a:r>
-              <a:rPr lang="en-US" dirty="0" err="1">
-                <a:latin typeface="Arial" panose="020B0604020202020204" pitchFamily="34" charset="0"/>
-                <a:cs typeface="Arial" panose="020B0604020202020204" pitchFamily="34" charset="0"/>
-              </a:rPr>
-              <a:t>xây</a:t>
-            </a:r>
-            <a:r>
-              <a:rPr lang="en-US" dirty="0">
-                <a:latin typeface="Arial" panose="020B0604020202020204" pitchFamily="34" charset="0"/>
-                <a:cs typeface="Arial" panose="020B0604020202020204" pitchFamily="34" charset="0"/>
-              </a:rPr>
-              <a:t> </a:t>
-            </a:r>
-            <a:r>
-              <a:rPr lang="en-US" dirty="0" err="1">
-                <a:latin typeface="Arial" panose="020B0604020202020204" pitchFamily="34" charset="0"/>
-                <a:cs typeface="Arial" panose="020B0604020202020204" pitchFamily="34" charset="0"/>
-              </a:rPr>
-              <a:t>dựng</a:t>
-            </a:r>
-            <a:r>
-              <a:rPr lang="en-US" dirty="0">
-                <a:latin typeface="Arial" panose="020B0604020202020204" pitchFamily="34" charset="0"/>
-                <a:cs typeface="Arial" panose="020B0604020202020204" pitchFamily="34" charset="0"/>
-              </a:rPr>
-              <a:t> đ</a:t>
-            </a:r>
-            <a:r>
-              <a:rPr lang="vi-VN" dirty="0">
-                <a:latin typeface="Arial" panose="020B0604020202020204" pitchFamily="34" charset="0"/>
-                <a:cs typeface="Arial" panose="020B0604020202020204" pitchFamily="34" charset="0"/>
-              </a:rPr>
-              <a:t>ư</a:t>
-            </a:r>
-            <a:r>
-              <a:rPr lang="en-US" dirty="0" err="1">
-                <a:latin typeface="Arial" panose="020B0604020202020204" pitchFamily="34" charset="0"/>
-                <a:cs typeface="Arial" panose="020B0604020202020204" pitchFamily="34" charset="0"/>
-              </a:rPr>
-              <a:t>ợc</a:t>
-            </a:r>
-            <a:r>
-              <a:rPr lang="en-US" dirty="0">
-                <a:latin typeface="Arial" panose="020B0604020202020204" pitchFamily="34" charset="0"/>
-                <a:cs typeface="Arial" panose="020B0604020202020204" pitchFamily="34" charset="0"/>
-              </a:rPr>
-              <a:t> </a:t>
-            </a:r>
-            <a:r>
-              <a:rPr lang="en-US" dirty="0" err="1">
-                <a:latin typeface="Arial" panose="020B0604020202020204" pitchFamily="34" charset="0"/>
-                <a:cs typeface="Arial" panose="020B0604020202020204" pitchFamily="34" charset="0"/>
-              </a:rPr>
-              <a:t>hệ</a:t>
-            </a:r>
-            <a:r>
-              <a:rPr lang="en-US" dirty="0">
-                <a:latin typeface="Arial" panose="020B0604020202020204" pitchFamily="34" charset="0"/>
-                <a:cs typeface="Arial" panose="020B0604020202020204" pitchFamily="34" charset="0"/>
-              </a:rPr>
-              <a:t> </a:t>
-            </a:r>
-            <a:r>
-              <a:rPr lang="en-US" dirty="0" err="1">
-                <a:latin typeface="Arial" panose="020B0604020202020204" pitchFamily="34" charset="0"/>
-                <a:cs typeface="Arial" panose="020B0604020202020204" pitchFamily="34" charset="0"/>
-              </a:rPr>
-              <a:t>thống</a:t>
-            </a:r>
-            <a:r>
-              <a:rPr lang="en-US" dirty="0">
-                <a:latin typeface="Arial" panose="020B0604020202020204" pitchFamily="34" charset="0"/>
-                <a:cs typeface="Arial" panose="020B0604020202020204" pitchFamily="34" charset="0"/>
-              </a:rPr>
-              <a:t> </a:t>
-            </a:r>
-            <a:r>
-              <a:rPr lang="en-US" dirty="0" err="1">
-                <a:latin typeface="Arial" panose="020B0604020202020204" pitchFamily="34" charset="0"/>
-                <a:cs typeface="Arial" panose="020B0604020202020204" pitchFamily="34" charset="0"/>
-              </a:rPr>
-              <a:t>chăm</a:t>
-            </a:r>
-            <a:r>
-              <a:rPr lang="en-US" dirty="0">
-                <a:latin typeface="Arial" panose="020B0604020202020204" pitchFamily="34" charset="0"/>
-                <a:cs typeface="Arial" panose="020B0604020202020204" pitchFamily="34" charset="0"/>
-              </a:rPr>
-              <a:t> </a:t>
-            </a:r>
-            <a:r>
-              <a:rPr lang="en-US" dirty="0" err="1">
-                <a:latin typeface="Arial" panose="020B0604020202020204" pitchFamily="34" charset="0"/>
-                <a:cs typeface="Arial" panose="020B0604020202020204" pitchFamily="34" charset="0"/>
-              </a:rPr>
-              <a:t>sóc</a:t>
-            </a:r>
-            <a:r>
-              <a:rPr lang="en-US" dirty="0">
-                <a:latin typeface="Arial" panose="020B0604020202020204" pitchFamily="34" charset="0"/>
-                <a:cs typeface="Arial" panose="020B0604020202020204" pitchFamily="34" charset="0"/>
-              </a:rPr>
-              <a:t> </a:t>
-            </a:r>
-            <a:r>
-              <a:rPr lang="en-US" dirty="0" err="1">
-                <a:latin typeface="Arial" panose="020B0604020202020204" pitchFamily="34" charset="0"/>
-                <a:cs typeface="Arial" panose="020B0604020202020204" pitchFamily="34" charset="0"/>
-              </a:rPr>
-              <a:t>khách</a:t>
-            </a:r>
-            <a:r>
-              <a:rPr lang="en-US" dirty="0">
-                <a:latin typeface="Arial" panose="020B0604020202020204" pitchFamily="34" charset="0"/>
-                <a:cs typeface="Arial" panose="020B0604020202020204" pitchFamily="34" charset="0"/>
-              </a:rPr>
-              <a:t> </a:t>
-            </a:r>
-            <a:r>
-              <a:rPr lang="en-US" dirty="0" err="1">
-                <a:latin typeface="Arial" panose="020B0604020202020204" pitchFamily="34" charset="0"/>
-                <a:cs typeface="Arial" panose="020B0604020202020204" pitchFamily="34" charset="0"/>
-              </a:rPr>
-              <a:t>hàng</a:t>
-            </a:r>
-            <a:r>
-              <a:rPr lang="en-US" dirty="0">
-                <a:latin typeface="Arial" panose="020B0604020202020204" pitchFamily="34" charset="0"/>
-                <a:cs typeface="Arial" panose="020B0604020202020204" pitchFamily="34" charset="0"/>
-              </a:rPr>
-              <a:t>.</a:t>
-            </a:r>
-          </a:p>
-        </p:txBody>
-      </p:sp>
-      <p:sp>
-        <p:nvSpPr>
-          <p:cNvPr id="7" name="Oval 6"/>
-          <p:cNvSpPr/>
-          <p:nvPr/>
-        </p:nvSpPr>
-        <p:spPr>
-          <a:xfrm>
-            <a:off x="7788115" y="3190853"/>
-            <a:ext cx="2616967" cy="1520323"/>
-          </a:xfrm>
-          <a:prstGeom prst="ellipse">
-            <a:avLst/>
-          </a:prstGeom>
-          <a:solidFill>
-            <a:schemeClr val="accent1">
-              <a:lumMod val="20000"/>
-              <a:lumOff val="80000"/>
-            </a:schemeClr>
-          </a:solidFill>
-        </p:spPr>
-        <p:style>
-          <a:lnRef idx="2">
-            <a:schemeClr val="accent1">
-              <a:shade val="50000"/>
-            </a:schemeClr>
-          </a:lnRef>
-          <a:fillRef idx="1">
-            <a:schemeClr val="accent1"/>
-          </a:fillRef>
-          <a:effectRef idx="0">
-            <a:schemeClr val="accent1"/>
-          </a:effectRef>
-          <a:fontRef idx="minor">
-            <a:schemeClr val="lt1"/>
-          </a:fontRef>
-        </p:style>
-        <p:txBody>
-          <a:bodyPr rtlCol="0" anchor="ctr"/>
-          <a:lstStyle/>
-          <a:p>
-            <a:pPr algn="ctr"/>
-            <a:r>
-              <a:rPr lang="en-US" b="1" dirty="0">
-                <a:solidFill>
-                  <a:srgbClr val="C00000"/>
-                </a:solidFill>
-                <a:effectLst>
-                  <a:outerShdw blurRad="38100" dist="38100" dir="2700000" algn="tl">
-                    <a:srgbClr val="000000">
-                      <a:alpha val="43137"/>
-                    </a:srgbClr>
-                  </a:outerShdw>
-                </a:effectLst>
-                <a:latin typeface="Arial" panose="020B0604020202020204" pitchFamily="34" charset="0"/>
-                <a:cs typeface="Arial" panose="020B0604020202020204" pitchFamily="34" charset="0"/>
-              </a:rPr>
-              <a:t>NH</a:t>
-            </a:r>
-            <a:r>
-              <a:rPr lang="vi-VN" b="1" dirty="0">
-                <a:solidFill>
-                  <a:srgbClr val="C00000"/>
-                </a:solidFill>
-                <a:effectLst>
-                  <a:outerShdw blurRad="38100" dist="38100" dir="2700000" algn="tl">
-                    <a:srgbClr val="000000">
-                      <a:alpha val="43137"/>
-                    </a:srgbClr>
-                  </a:outerShdw>
-                </a:effectLst>
-                <a:latin typeface="Arial" panose="020B0604020202020204" pitchFamily="34" charset="0"/>
-                <a:cs typeface="Arial" panose="020B0604020202020204" pitchFamily="34" charset="0"/>
-              </a:rPr>
-              <a:t>Ư</a:t>
-            </a:r>
-            <a:r>
-              <a:rPr lang="en-US" b="1" dirty="0">
-                <a:solidFill>
-                  <a:srgbClr val="C00000"/>
-                </a:solidFill>
-                <a:effectLst>
-                  <a:outerShdw blurRad="38100" dist="38100" dir="2700000" algn="tl">
-                    <a:srgbClr val="000000">
-                      <a:alpha val="43137"/>
-                    </a:srgbClr>
-                  </a:outerShdw>
-                </a:effectLst>
-                <a:latin typeface="Arial" panose="020B0604020202020204" pitchFamily="34" charset="0"/>
-                <a:cs typeface="Arial" panose="020B0604020202020204" pitchFamily="34" charset="0"/>
-              </a:rPr>
-              <a:t>ỢC ĐIỂM</a:t>
-            </a:r>
-          </a:p>
-        </p:txBody>
-      </p:sp>
-      <p:sp>
-        <p:nvSpPr>
-          <p:cNvPr id="5" name="Arrow: Pentagon 9"/>
-          <p:cNvSpPr/>
-          <p:nvPr/>
-        </p:nvSpPr>
-        <p:spPr>
-          <a:xfrm>
-            <a:off x="879609" y="4231046"/>
-            <a:ext cx="6115687" cy="1421227"/>
-          </a:xfrm>
-          <a:prstGeom prst="homePlate">
-            <a:avLst/>
-          </a:prstGeom>
-        </p:spPr>
-        <p:style>
-          <a:lnRef idx="2">
-            <a:schemeClr val="accent1">
-              <a:shade val="50000"/>
-            </a:schemeClr>
-          </a:lnRef>
-          <a:fillRef idx="1">
-            <a:schemeClr val="accent1"/>
-          </a:fillRef>
-          <a:effectRef idx="0">
-            <a:schemeClr val="accent1"/>
-          </a:effectRef>
-          <a:fontRef idx="minor">
-            <a:schemeClr val="lt1"/>
-          </a:fontRef>
-        </p:style>
-        <p:txBody>
-          <a:bodyPr rtlCol="0" anchor="ctr"/>
-          <a:lstStyle/>
-          <a:p>
-            <a:pPr algn="ctr"/>
-            <a:r>
-              <a:rPr lang="en-US" dirty="0">
-                <a:latin typeface="Arial" panose="020B0604020202020204" pitchFamily="34" charset="0"/>
-                <a:cs typeface="Arial" panose="020B0604020202020204" pitchFamily="34" charset="0"/>
-              </a:rPr>
-              <a:t>Ch</a:t>
-            </a:r>
-            <a:r>
-              <a:rPr lang="vi-VN" dirty="0">
-                <a:latin typeface="Arial" panose="020B0604020202020204" pitchFamily="34" charset="0"/>
-                <a:cs typeface="Arial" panose="020B0604020202020204" pitchFamily="34" charset="0"/>
-              </a:rPr>
-              <a:t>ư</a:t>
-            </a:r>
-            <a:r>
-              <a:rPr lang="en-US" dirty="0">
-                <a:latin typeface="Arial" panose="020B0604020202020204" pitchFamily="34" charset="0"/>
-                <a:cs typeface="Arial" panose="020B0604020202020204" pitchFamily="34" charset="0"/>
-              </a:rPr>
-              <a:t>a </a:t>
-            </a:r>
-            <a:r>
-              <a:rPr lang="en-US" dirty="0" err="1">
-                <a:latin typeface="Arial" panose="020B0604020202020204" pitchFamily="34" charset="0"/>
-                <a:cs typeface="Arial" panose="020B0604020202020204" pitchFamily="34" charset="0"/>
-              </a:rPr>
-              <a:t>hoàn</a:t>
-            </a:r>
-            <a:r>
-              <a:rPr lang="en-US" dirty="0">
-                <a:latin typeface="Arial" panose="020B0604020202020204" pitchFamily="34" charset="0"/>
-                <a:cs typeface="Arial" panose="020B0604020202020204" pitchFamily="34" charset="0"/>
-              </a:rPr>
-              <a:t> </a:t>
-            </a:r>
-            <a:r>
-              <a:rPr lang="en-US" dirty="0" err="1">
-                <a:latin typeface="Arial" panose="020B0604020202020204" pitchFamily="34" charset="0"/>
-                <a:cs typeface="Arial" panose="020B0604020202020204" pitchFamily="34" charset="0"/>
-              </a:rPr>
-              <a:t>thiện</a:t>
-            </a:r>
-            <a:r>
-              <a:rPr lang="en-US" dirty="0">
-                <a:latin typeface="Arial" panose="020B0604020202020204" pitchFamily="34" charset="0"/>
-                <a:cs typeface="Arial" panose="020B0604020202020204" pitchFamily="34" charset="0"/>
-              </a:rPr>
-              <a:t> đ</a:t>
-            </a:r>
-            <a:r>
-              <a:rPr lang="vi-VN" dirty="0">
-                <a:latin typeface="Arial" panose="020B0604020202020204" pitchFamily="34" charset="0"/>
-                <a:cs typeface="Arial" panose="020B0604020202020204" pitchFamily="34" charset="0"/>
-              </a:rPr>
-              <a:t>ư</a:t>
-            </a:r>
-            <a:r>
-              <a:rPr lang="en-US" dirty="0" err="1">
-                <a:latin typeface="Arial" panose="020B0604020202020204" pitchFamily="34" charset="0"/>
-                <a:cs typeface="Arial" panose="020B0604020202020204" pitchFamily="34" charset="0"/>
-              </a:rPr>
-              <a:t>ợc</a:t>
-            </a:r>
-            <a:r>
-              <a:rPr lang="en-US" dirty="0">
-                <a:latin typeface="Arial" panose="020B0604020202020204" pitchFamily="34" charset="0"/>
-                <a:cs typeface="Arial" panose="020B0604020202020204" pitchFamily="34" charset="0"/>
-              </a:rPr>
-              <a:t> </a:t>
-            </a:r>
-            <a:r>
-              <a:rPr lang="en-US" dirty="0" err="1">
-                <a:latin typeface="Arial" panose="020B0604020202020204" pitchFamily="34" charset="0"/>
-                <a:cs typeface="Arial" panose="020B0604020202020204" pitchFamily="34" charset="0"/>
-              </a:rPr>
-              <a:t>chức</a:t>
-            </a:r>
-            <a:r>
-              <a:rPr lang="en-US" dirty="0">
-                <a:latin typeface="Arial" panose="020B0604020202020204" pitchFamily="34" charset="0"/>
-                <a:cs typeface="Arial" panose="020B0604020202020204" pitchFamily="34" charset="0"/>
-              </a:rPr>
-              <a:t> </a:t>
-            </a:r>
-            <a:r>
-              <a:rPr lang="en-US" dirty="0" err="1">
-                <a:latin typeface="Arial" panose="020B0604020202020204" pitchFamily="34" charset="0"/>
-                <a:cs typeface="Arial" panose="020B0604020202020204" pitchFamily="34" charset="0"/>
-              </a:rPr>
-              <a:t>năng</a:t>
-            </a:r>
-            <a:r>
-              <a:rPr lang="en-US" dirty="0">
-                <a:latin typeface="Arial" panose="020B0604020202020204" pitchFamily="34" charset="0"/>
-                <a:cs typeface="Arial" panose="020B0604020202020204" pitchFamily="34" charset="0"/>
-              </a:rPr>
-              <a:t> </a:t>
-            </a:r>
-            <a:r>
-              <a:rPr lang="en-US" dirty="0" err="1">
-                <a:latin typeface="Arial" panose="020B0604020202020204" pitchFamily="34" charset="0"/>
-                <a:cs typeface="Arial" panose="020B0604020202020204" pitchFamily="34" charset="0"/>
-              </a:rPr>
-              <a:t>gởi</a:t>
-            </a:r>
-            <a:r>
-              <a:rPr lang="en-US" dirty="0">
-                <a:latin typeface="Arial" panose="020B0604020202020204" pitchFamily="34" charset="0"/>
-                <a:cs typeface="Arial" panose="020B0604020202020204" pitchFamily="34" charset="0"/>
-              </a:rPr>
-              <a:t> mail </a:t>
-            </a:r>
-            <a:r>
-              <a:rPr lang="en-US" dirty="0" err="1">
-                <a:latin typeface="Arial" panose="020B0604020202020204" pitchFamily="34" charset="0"/>
-                <a:cs typeface="Arial" panose="020B0604020202020204" pitchFamily="34" charset="0"/>
-              </a:rPr>
-              <a:t>để</a:t>
-            </a:r>
-            <a:r>
-              <a:rPr lang="en-US" dirty="0">
-                <a:latin typeface="Arial" panose="020B0604020202020204" pitchFamily="34" charset="0"/>
-                <a:cs typeface="Arial" panose="020B0604020202020204" pitchFamily="34" charset="0"/>
-              </a:rPr>
-              <a:t> </a:t>
-            </a:r>
-            <a:r>
-              <a:rPr lang="en-US" dirty="0" err="1">
-                <a:latin typeface="Arial" panose="020B0604020202020204" pitchFamily="34" charset="0"/>
-                <a:cs typeface="Arial" panose="020B0604020202020204" pitchFamily="34" charset="0"/>
-              </a:rPr>
-              <a:t>hỗ</a:t>
-            </a:r>
-            <a:r>
-              <a:rPr lang="en-US" dirty="0">
-                <a:latin typeface="Arial" panose="020B0604020202020204" pitchFamily="34" charset="0"/>
-                <a:cs typeface="Arial" panose="020B0604020202020204" pitchFamily="34" charset="0"/>
-              </a:rPr>
-              <a:t> </a:t>
-            </a:r>
-            <a:r>
-              <a:rPr lang="en-US" dirty="0" err="1">
-                <a:latin typeface="Arial" panose="020B0604020202020204" pitchFamily="34" charset="0"/>
-                <a:cs typeface="Arial" panose="020B0604020202020204" pitchFamily="34" charset="0"/>
-              </a:rPr>
-              <a:t>trợ</a:t>
-            </a:r>
-            <a:r>
-              <a:rPr lang="en-US" dirty="0">
-                <a:latin typeface="Arial" panose="020B0604020202020204" pitchFamily="34" charset="0"/>
-                <a:cs typeface="Arial" panose="020B0604020202020204" pitchFamily="34" charset="0"/>
-              </a:rPr>
-              <a:t> </a:t>
-            </a:r>
-            <a:r>
-              <a:rPr lang="en-US" dirty="0" err="1">
-                <a:latin typeface="Arial" panose="020B0604020202020204" pitchFamily="34" charset="0"/>
-                <a:cs typeface="Arial" panose="020B0604020202020204" pitchFamily="34" charset="0"/>
-              </a:rPr>
-              <a:t>khách</a:t>
-            </a:r>
-            <a:r>
-              <a:rPr lang="en-US" dirty="0">
-                <a:latin typeface="Arial" panose="020B0604020202020204" pitchFamily="34" charset="0"/>
-                <a:cs typeface="Arial" panose="020B0604020202020204" pitchFamily="34" charset="0"/>
-              </a:rPr>
-              <a:t> </a:t>
-            </a:r>
-            <a:r>
-              <a:rPr lang="en-US" dirty="0" err="1">
-                <a:latin typeface="Arial" panose="020B0604020202020204" pitchFamily="34" charset="0"/>
-                <a:cs typeface="Arial" panose="020B0604020202020204" pitchFamily="34" charset="0"/>
-              </a:rPr>
-              <a:t>mua</a:t>
-            </a:r>
-            <a:r>
-              <a:rPr lang="en-US" dirty="0">
-                <a:latin typeface="Arial" panose="020B0604020202020204" pitchFamily="34" charset="0"/>
-                <a:cs typeface="Arial" panose="020B0604020202020204" pitchFamily="34" charset="0"/>
-              </a:rPr>
-              <a:t> hang.</a:t>
-            </a:r>
-          </a:p>
-        </p:txBody>
-      </p:sp>
-    </p:spTree>
-  </p:cSld>
-  <p:clrMapOvr>
-    <a:masterClrMapping/>
-  </p:clrMapOvr>
-  <mc:AlternateContent xmlns:mc="http://schemas.openxmlformats.org/markup-compatibility/2006" xmlns:p14="http://schemas.microsoft.com/office/powerpoint/2010/main">
-    <mc:Choice Requires="p14">
-      <p:transition spd="slow" p14:dur="1400">
-        <p14:doors dir="vert"/>
-      </p:transition>
-    </mc:Choice>
-    <mc:Fallback xmlns="">
-      <p:transition spd="slow">
-        <p:fade/>
-      </p:transition>
-    </mc:Fallback>
-  </mc:AlternateContent>
-  <p:timing>
-    <p:tnLst>
-      <p:par>
-        <p:cTn id="1" dur="indefinite" restart="never" nodeType="tmRoot">
-          <p:childTnLst>
-            <p:seq concurrent="1" nextAc="seek">
-              <p:cTn id="2" dur="indefinite" nodeType="mainSeq">
-                <p:childTnLst>
-                  <p:par>
-                    <p:cTn id="3" fill="hold">
-                      <p:stCondLst>
-                        <p:cond delay="indefinite"/>
-                      </p:stCondLst>
-                      <p:childTnLst>
-                        <p:par>
-                          <p:cTn id="4" fill="hold">
-                            <p:stCondLst>
-                              <p:cond delay="0"/>
-                            </p:stCondLst>
-                            <p:childTnLst>
-                              <p:par>
-                                <p:cTn id="5" presetID="42" presetClass="entr" presetSubtype="0" fill="hold" grpId="0" nodeType="clickEffect">
-                                  <p:stCondLst>
-                                    <p:cond delay="0"/>
-                                  </p:stCondLst>
-                                  <p:childTnLst>
-                                    <p:set>
-                                      <p:cBhvr>
-                                        <p:cTn id="6" dur="1" fill="hold">
-                                          <p:stCondLst>
-                                            <p:cond delay="0"/>
-                                          </p:stCondLst>
-                                        </p:cTn>
-                                        <p:tgtEl>
-                                          <p:spTgt spid="4"/>
-                                        </p:tgtEl>
-                                        <p:attrNameLst>
-                                          <p:attrName>style.visibility</p:attrName>
-                                        </p:attrNameLst>
-                                      </p:cBhvr>
-                                      <p:to>
-                                        <p:strVal val="visible"/>
-                                      </p:to>
-                                    </p:set>
-                                    <p:animEffect transition="in" filter="fade">
-                                      <p:cBhvr>
-                                        <p:cTn id="7" dur="1000"/>
-                                        <p:tgtEl>
-                                          <p:spTgt spid="4"/>
-                                        </p:tgtEl>
-                                      </p:cBhvr>
-                                    </p:animEffect>
-                                    <p:anim calcmode="lin" valueType="num">
-                                      <p:cBhvr>
-                                        <p:cTn id="8" dur="1000" fill="hold"/>
-                                        <p:tgtEl>
-                                          <p:spTgt spid="4"/>
-                                        </p:tgtEl>
-                                        <p:attrNameLst>
-                                          <p:attrName>ppt_x</p:attrName>
-                                        </p:attrNameLst>
-                                      </p:cBhvr>
-                                      <p:tavLst>
-                                        <p:tav tm="0">
-                                          <p:val>
-                                            <p:strVal val="#ppt_x"/>
-                                          </p:val>
-                                        </p:tav>
-                                        <p:tav tm="100000">
-                                          <p:val>
-                                            <p:strVal val="#ppt_x"/>
-                                          </p:val>
-                                        </p:tav>
-                                      </p:tavLst>
-                                    </p:anim>
-                                    <p:anim calcmode="lin" valueType="num">
-                                      <p:cBhvr>
-                                        <p:cTn id="9" dur="1000" fill="hold"/>
-                                        <p:tgtEl>
-                                          <p:spTgt spid="4"/>
-                                        </p:tgtEl>
-                                        <p:attrNameLst>
-                                          <p:attrName>ppt_y</p:attrName>
-                                        </p:attrNameLst>
-                                      </p:cBhvr>
-                                      <p:tavLst>
-                                        <p:tav tm="0">
-                                          <p:val>
-                                            <p:strVal val="#ppt_y+.1"/>
-                                          </p:val>
-                                        </p:tav>
-                                        <p:tav tm="100000">
-                                          <p:val>
-                                            <p:strVal val="#ppt_y"/>
-                                          </p:val>
-                                        </p:tav>
-                                      </p:tavLst>
-                                    </p:anim>
-                                  </p:childTnLst>
-                                </p:cTn>
-                              </p:par>
-                            </p:childTnLst>
-                          </p:cTn>
-                        </p:par>
-                      </p:childTnLst>
-                    </p:cTn>
-                  </p:par>
-                  <p:par>
-                    <p:cTn id="10" fill="hold">
-                      <p:stCondLst>
-                        <p:cond delay="indefinite"/>
-                      </p:stCondLst>
-                      <p:childTnLst>
-                        <p:par>
-                          <p:cTn id="11" fill="hold">
-                            <p:stCondLst>
-                              <p:cond delay="0"/>
-                            </p:stCondLst>
-                            <p:childTnLst>
-                              <p:par>
-                                <p:cTn id="12" presetID="42" presetClass="entr" presetSubtype="0" fill="hold" grpId="0" nodeType="clickEffect">
-                                  <p:stCondLst>
-                                    <p:cond delay="0"/>
-                                  </p:stCondLst>
-                                  <p:childTnLst>
-                                    <p:set>
-                                      <p:cBhvr>
-                                        <p:cTn id="13" dur="1" fill="hold">
-                                          <p:stCondLst>
-                                            <p:cond delay="0"/>
-                                          </p:stCondLst>
-                                        </p:cTn>
-                                        <p:tgtEl>
-                                          <p:spTgt spid="5"/>
-                                        </p:tgtEl>
-                                        <p:attrNameLst>
-                                          <p:attrName>style.visibility</p:attrName>
-                                        </p:attrNameLst>
-                                      </p:cBhvr>
-                                      <p:to>
-                                        <p:strVal val="visible"/>
-                                      </p:to>
-                                    </p:set>
-                                    <p:animEffect transition="in" filter="fade">
-                                      <p:cBhvr>
-                                        <p:cTn id="14" dur="1000"/>
-                                        <p:tgtEl>
-                                          <p:spTgt spid="5"/>
-                                        </p:tgtEl>
-                                      </p:cBhvr>
-                                    </p:animEffect>
-                                    <p:anim calcmode="lin" valueType="num">
-                                      <p:cBhvr>
-                                        <p:cTn id="15" dur="1000" fill="hold"/>
-                                        <p:tgtEl>
-                                          <p:spTgt spid="5"/>
-                                        </p:tgtEl>
-                                        <p:attrNameLst>
-                                          <p:attrName>ppt_x</p:attrName>
-                                        </p:attrNameLst>
-                                      </p:cBhvr>
-                                      <p:tavLst>
-                                        <p:tav tm="0">
-                                          <p:val>
-                                            <p:strVal val="#ppt_x"/>
-                                          </p:val>
-                                        </p:tav>
-                                        <p:tav tm="100000">
-                                          <p:val>
-                                            <p:strVal val="#ppt_x"/>
-                                          </p:val>
-                                        </p:tav>
-                                      </p:tavLst>
-                                    </p:anim>
-                                    <p:anim calcmode="lin" valueType="num">
-                                      <p:cBhvr>
-                                        <p:cTn id="16" dur="1000" fill="hold"/>
-                                        <p:tgtEl>
-                                          <p:spTgt spid="5"/>
-                                        </p:tgtEl>
-                                        <p:attrNameLst>
-                                          <p:attrName>ppt_y</p:attrName>
-                                        </p:attrNameLst>
-                                      </p:cBhvr>
-                                      <p:tavLst>
-                                        <p:tav tm="0">
-                                          <p:val>
-                                            <p:strVal val="#ppt_y+.1"/>
-                                          </p:val>
-                                        </p:tav>
-                                        <p:tav tm="100000">
-                                          <p:val>
-                                            <p:strVal val="#ppt_y"/>
-                                          </p:val>
-                                        </p:tav>
-                                      </p:tavLst>
-                                    </p:anim>
-                                  </p:childTnLst>
-                                </p:cTn>
-                              </p:par>
-                            </p:childTnLst>
-                          </p:cTn>
-                        </p:par>
-                      </p:childTnLst>
-                    </p:cTn>
-                  </p:par>
-                </p:childTnLst>
-              </p:cTn>
-              <p:prevCondLst>
-                <p:cond evt="onPrev" delay="0">
-                  <p:tgtEl>
-                    <p:sldTgt/>
-                  </p:tgtEl>
-                </p:cond>
-              </p:prevCondLst>
-              <p:nextCondLst>
-                <p:cond evt="onNext" delay="0">
-                  <p:tgtEl>
-                    <p:sldTgt/>
-                  </p:tgtEl>
-                </p:cond>
-              </p:nextCondLst>
-            </p:seq>
-          </p:childTnLst>
-        </p:cTn>
-      </p:par>
-    </p:tnLst>
-    <p:bldLst>
-      <p:bldP spid="4" grpId="0" bldLvl="0" animBg="1"/>
-      <p:bldP spid="5" grpId="0" bldLvl="0" animBg="1"/>
-    </p:bldLst>
-  </p:timing>
-</p:sld>
-</file>
-
-<file path=ppt/slides/slide4.xml><?xml version="1.0" encoding="utf-8"?>
 <p:sld xmlns:a="http://schemas.openxmlformats.org/drawingml/2006/main" xmlns:r="http://schemas.openxmlformats.org/officeDocument/2006/relationships" xmlns:p="http://schemas.openxmlformats.org/presentationml/2006/main">
   <p:cSld>
     <p:spTree>
@@ -13334,7 +10097,7 @@
   </a:extraClrSchemeLst>
   <a:extLst>
     <a:ext uri="{05A4C25C-085E-4340-85A3-A5531E510DB2}">
-      <thm15:themeFamily xmlns="" xmlns:thm15="http://schemas.microsoft.com/office/thememl/2012/main" name="Office Theme" id="{62F939B6-93AF-4DB8-9C6B-D6C7DFDC589F}" vid="{4A3C46E8-61CC-4603-A589-7422A47A8E4A}"/>
+      <thm15:themeFamily xmlns:thm15="http://schemas.microsoft.com/office/thememl/2012/main" xmlns="" name="Office Theme" id="{62F939B6-93AF-4DB8-9C6B-D6C7DFDC589F}" vid="{4A3C46E8-61CC-4603-A589-7422A47A8E4A}"/>
     </a:ext>
   </a:extLst>
 </a:theme>
@@ -13595,7 +10358,7 @@
   <a:extraClrSchemeLst/>
   <a:extLst>
     <a:ext uri="{05A4C25C-085E-4340-85A3-A5531E510DB2}">
-      <thm15:themeFamily xmlns="" xmlns:thm15="http://schemas.microsoft.com/office/thememl/2012/main" name="Office Theme" id="{62F939B6-93AF-4DB8-9C6B-D6C7DFDC589F}" vid="{4A3C46E8-61CC-4603-A589-7422A47A8E4A}"/>
+      <thm15:themeFamily xmlns:thm15="http://schemas.microsoft.com/office/thememl/2012/main" xmlns="" name="Office Theme" id="{62F939B6-93AF-4DB8-9C6B-D6C7DFDC589F}" vid="{4A3C46E8-61CC-4603-A589-7422A47A8E4A}"/>
     </a:ext>
   </a:extLst>
 </a:theme>

</xml_diff>